<commit_message>
wie wird was getestet pp
</commit_message>
<xml_diff>
--- a/Matthias/02-Patients3MBq/Was_wird_wie_getestet.pptx
+++ b/Matthias/02-Patients3MBq/Was_wird_wie_getestet.pptx
@@ -5734,7 +5734,7 @@
                       <a:prstClr val="white"/>
                     </a:solidFill>
                   </a:rPr>
-                  <a:t>… 5 weitere Dosen …</a:t>
+                  <a:t>… 11 weitere Dosen …</a:t>
                 </a:r>
               </a:p>
             </p:txBody>
@@ -6461,7 +6461,7 @@
                       <a:prstClr val="white"/>
                     </a:solidFill>
                   </a:rPr>
-                  <a:t>… 5 weitere Dosen …</a:t>
+                  <a:t>… 11 weitere Dosen …</a:t>
                 </a:r>
               </a:p>
             </p:txBody>
@@ -7188,7 +7188,7 @@
                       <a:prstClr val="white"/>
                     </a:solidFill>
                   </a:rPr>
-                  <a:t>… 5 weitere Dosen …</a:t>
+                  <a:t>… 11 weitere Dosen …</a:t>
                 </a:r>
               </a:p>
             </p:txBody>

</xml_diff>

<commit_message>
playing around for good visualisation of 3MBq TFValues
</commit_message>
<xml_diff>
--- a/Matthias/02-Patients3MBq/Was_wird_wie_getestet.pptx
+++ b/Matthias/02-Patients3MBq/Was_wird_wie_getestet.pptx
@@ -6,7 +6,8 @@
   </p:sldMasterIdLst>
   <p:sldIdLst>
     <p:sldId id="256" r:id="rId2"/>
-    <p:sldId id="257" r:id="rId3"/>
+    <p:sldId id="259" r:id="rId3"/>
+    <p:sldId id="257" r:id="rId4"/>
   </p:sldIdLst>
   <p:sldSz cx="12192000" cy="6858000"/>
   <p:notesSz cx="6858000" cy="9144000"/>
@@ -260,7 +261,7 @@
           <a:p>
             <a:fld id="{6E20447D-E185-4F8E-8A5E-B1C6AF407A2E}" type="datetimeFigureOut">
               <a:rPr lang="de-DE" smtClean="0"/>
-              <a:t>24.03.2018</a:t>
+              <a:t>27.03.2018</a:t>
             </a:fld>
             <a:endParaRPr lang="de-DE"/>
           </a:p>
@@ -458,7 +459,7 @@
           <a:p>
             <a:fld id="{6E20447D-E185-4F8E-8A5E-B1C6AF407A2E}" type="datetimeFigureOut">
               <a:rPr lang="de-DE" smtClean="0"/>
-              <a:t>24.03.2018</a:t>
+              <a:t>27.03.2018</a:t>
             </a:fld>
             <a:endParaRPr lang="de-DE"/>
           </a:p>
@@ -666,7 +667,7 @@
           <a:p>
             <a:fld id="{6E20447D-E185-4F8E-8A5E-B1C6AF407A2E}" type="datetimeFigureOut">
               <a:rPr lang="de-DE" smtClean="0"/>
-              <a:t>24.03.2018</a:t>
+              <a:t>27.03.2018</a:t>
             </a:fld>
             <a:endParaRPr lang="de-DE"/>
           </a:p>
@@ -864,7 +865,7 @@
           <a:p>
             <a:fld id="{6E20447D-E185-4F8E-8A5E-B1C6AF407A2E}" type="datetimeFigureOut">
               <a:rPr lang="de-DE" smtClean="0"/>
-              <a:t>24.03.2018</a:t>
+              <a:t>27.03.2018</a:t>
             </a:fld>
             <a:endParaRPr lang="de-DE"/>
           </a:p>
@@ -1139,7 +1140,7 @@
           <a:p>
             <a:fld id="{6E20447D-E185-4F8E-8A5E-B1C6AF407A2E}" type="datetimeFigureOut">
               <a:rPr lang="de-DE" smtClean="0"/>
-              <a:t>24.03.2018</a:t>
+              <a:t>27.03.2018</a:t>
             </a:fld>
             <a:endParaRPr lang="de-DE"/>
           </a:p>
@@ -1404,7 +1405,7 @@
           <a:p>
             <a:fld id="{6E20447D-E185-4F8E-8A5E-B1C6AF407A2E}" type="datetimeFigureOut">
               <a:rPr lang="de-DE" smtClean="0"/>
-              <a:t>24.03.2018</a:t>
+              <a:t>27.03.2018</a:t>
             </a:fld>
             <a:endParaRPr lang="de-DE"/>
           </a:p>
@@ -1816,7 +1817,7 @@
           <a:p>
             <a:fld id="{6E20447D-E185-4F8E-8A5E-B1C6AF407A2E}" type="datetimeFigureOut">
               <a:rPr lang="de-DE" smtClean="0"/>
-              <a:t>24.03.2018</a:t>
+              <a:t>27.03.2018</a:t>
             </a:fld>
             <a:endParaRPr lang="de-DE"/>
           </a:p>
@@ -1957,7 +1958,7 @@
           <a:p>
             <a:fld id="{6E20447D-E185-4F8E-8A5E-B1C6AF407A2E}" type="datetimeFigureOut">
               <a:rPr lang="de-DE" smtClean="0"/>
-              <a:t>24.03.2018</a:t>
+              <a:t>27.03.2018</a:t>
             </a:fld>
             <a:endParaRPr lang="de-DE"/>
           </a:p>
@@ -2070,7 +2071,7 @@
           <a:p>
             <a:fld id="{6E20447D-E185-4F8E-8A5E-B1C6AF407A2E}" type="datetimeFigureOut">
               <a:rPr lang="de-DE" smtClean="0"/>
-              <a:t>24.03.2018</a:t>
+              <a:t>27.03.2018</a:t>
             </a:fld>
             <a:endParaRPr lang="de-DE"/>
           </a:p>
@@ -2381,7 +2382,7 @@
           <a:p>
             <a:fld id="{6E20447D-E185-4F8E-8A5E-B1C6AF407A2E}" type="datetimeFigureOut">
               <a:rPr lang="de-DE" smtClean="0"/>
-              <a:t>24.03.2018</a:t>
+              <a:t>27.03.2018</a:t>
             </a:fld>
             <a:endParaRPr lang="de-DE"/>
           </a:p>
@@ -2669,7 +2670,7 @@
           <a:p>
             <a:fld id="{6E20447D-E185-4F8E-8A5E-B1C6AF407A2E}" type="datetimeFigureOut">
               <a:rPr lang="de-DE" smtClean="0"/>
-              <a:t>24.03.2018</a:t>
+              <a:t>27.03.2018</a:t>
             </a:fld>
             <a:endParaRPr lang="de-DE"/>
           </a:p>
@@ -2910,7 +2911,7 @@
           <a:p>
             <a:fld id="{6E20447D-E185-4F8E-8A5E-B1C6AF407A2E}" type="datetimeFigureOut">
               <a:rPr lang="de-DE" smtClean="0"/>
-              <a:t>24.03.2018</a:t>
+              <a:t>27.03.2018</a:t>
             </a:fld>
             <a:endParaRPr lang="de-DE"/>
           </a:p>
@@ -8189,51 +8190,6 @@
           </a:p>
         </p:txBody>
       </p:sp>
-      <p:sp>
-        <p:nvSpPr>
-          <p:cNvPr id="6" name="Rechteck 5">
-            <a:extLst>
-              <a:ext uri="{FF2B5EF4-FFF2-40B4-BE49-F238E27FC236}">
-                <a16:creationId xmlns:a16="http://schemas.microsoft.com/office/drawing/2014/main" id="{E040E579-496A-4289-B991-B1809733A00F}"/>
-              </a:ext>
-            </a:extLst>
-          </p:cNvPr>
-          <p:cNvSpPr/>
-          <p:nvPr/>
-        </p:nvSpPr>
-        <p:spPr>
-          <a:xfrm>
-            <a:off x="4280439" y="3244334"/>
-            <a:ext cx="3631122" cy="369332"/>
-          </a:xfrm>
-          <a:prstGeom prst="rect">
-            <a:avLst/>
-          </a:prstGeom>
-        </p:spPr>
-        <p:txBody>
-          <a:bodyPr wrap="none">
-            <a:spAutoFit/>
-          </a:bodyPr>
-          <a:lstStyle/>
-          <a:p>
-            <a:r>
-              <a:rPr lang="en-US" dirty="0" err="1">
-                <a:solidFill>
-                  <a:srgbClr val="000000"/>
-                </a:solidFill>
-                <a:latin typeface="Courier New" panose="02070309020205020404" pitchFamily="49" charset="0"/>
-              </a:rPr>
-              <a:t>all_sizes_in_one_variable</a:t>
-            </a:r>
-            <a:endParaRPr lang="en-US" dirty="0">
-              <a:solidFill>
-                <a:srgbClr val="000000"/>
-              </a:solidFill>
-              <a:latin typeface="Courier New" panose="02070309020205020404" pitchFamily="49" charset="0"/>
-            </a:endParaRPr>
-          </a:p>
-        </p:txBody>
-      </p:sp>
     </p:spTree>
     <p:extLst>
       <p:ext uri="{BB962C8B-B14F-4D97-AF65-F5344CB8AC3E}">
@@ -8248,6 +8204,2495 @@
 </file>
 
 <file path=ppt/slides/slide2.xml><?xml version="1.0" encoding="utf-8"?>
+<p:sld xmlns:a="http://schemas.openxmlformats.org/drawingml/2006/main" xmlns:r="http://schemas.openxmlformats.org/officeDocument/2006/relationships" xmlns:p="http://schemas.openxmlformats.org/presentationml/2006/main">
+  <p:cSld>
+    <p:spTree>
+      <p:nvGrpSpPr>
+        <p:cNvPr id="1" name=""/>
+        <p:cNvGrpSpPr/>
+        <p:nvPr/>
+      </p:nvGrpSpPr>
+      <p:grpSpPr>
+        <a:xfrm>
+          <a:off x="0" y="0"/>
+          <a:ext cx="0" cy="0"/>
+          <a:chOff x="0" y="0"/>
+          <a:chExt cx="0" cy="0"/>
+        </a:xfrm>
+      </p:grpSpPr>
+      <p:grpSp>
+        <p:nvGrpSpPr>
+          <p:cNvPr id="3" name="Gruppieren 2">
+            <a:extLst>
+              <a:ext uri="{FF2B5EF4-FFF2-40B4-BE49-F238E27FC236}">
+                <a16:creationId xmlns:a16="http://schemas.microsoft.com/office/drawing/2014/main" id="{1CB3A14A-7062-473D-BFB2-056059B9F9C7}"/>
+              </a:ext>
+            </a:extLst>
+          </p:cNvPr>
+          <p:cNvGrpSpPr/>
+          <p:nvPr/>
+        </p:nvGrpSpPr>
+        <p:grpSpPr>
+          <a:xfrm>
+            <a:off x="2393589" y="1212211"/>
+            <a:ext cx="9627877" cy="4030908"/>
+            <a:chOff x="1258349" y="843093"/>
+            <a:chExt cx="9627877" cy="4030908"/>
+          </a:xfrm>
+        </p:grpSpPr>
+        <p:sp>
+          <p:nvSpPr>
+            <p:cNvPr id="7" name="Rechteck 6">
+              <a:extLst>
+                <a:ext uri="{FF2B5EF4-FFF2-40B4-BE49-F238E27FC236}">
+                  <a16:creationId xmlns:a16="http://schemas.microsoft.com/office/drawing/2014/main" id="{1D9A9778-E9DA-4A02-8B6C-8C5B434A67D5}"/>
+                </a:ext>
+              </a:extLst>
+            </p:cNvPr>
+            <p:cNvSpPr/>
+            <p:nvPr/>
+          </p:nvSpPr>
+          <p:spPr>
+            <a:xfrm>
+              <a:off x="6241409" y="2371986"/>
+              <a:ext cx="2153287" cy="673400"/>
+            </a:xfrm>
+            <a:prstGeom prst="rect">
+              <a:avLst/>
+            </a:prstGeom>
+          </p:spPr>
+          <p:style>
+            <a:lnRef idx="2">
+              <a:schemeClr val="accent1">
+                <a:shade val="50000"/>
+              </a:schemeClr>
+            </a:lnRef>
+            <a:fillRef idx="1">
+              <a:schemeClr val="accent1"/>
+            </a:fillRef>
+            <a:effectRef idx="0">
+              <a:schemeClr val="accent1"/>
+            </a:effectRef>
+            <a:fontRef idx="minor">
+              <a:schemeClr val="lt1"/>
+            </a:fontRef>
+          </p:style>
+          <p:txBody>
+            <a:bodyPr rtlCol="0" anchor="ctr"/>
+            <a:lstStyle/>
+            <a:p>
+              <a:pPr lvl="0" algn="ctr"/>
+              <a:r>
+                <a:rPr lang="de-DE" sz="1500" dirty="0">
+                  <a:solidFill>
+                    <a:prstClr val="white"/>
+                  </a:solidFill>
+                </a:rPr>
+                <a:t>… 16 weitere Patienten …</a:t>
+              </a:r>
+            </a:p>
+          </p:txBody>
+        </p:sp>
+        <p:grpSp>
+          <p:nvGrpSpPr>
+            <p:cNvPr id="23" name="Gruppieren 22">
+              <a:extLst>
+                <a:ext uri="{FF2B5EF4-FFF2-40B4-BE49-F238E27FC236}">
+                  <a16:creationId xmlns:a16="http://schemas.microsoft.com/office/drawing/2014/main" id="{F970D5B1-E3F8-4C18-AD01-9227F934D6D9}"/>
+                </a:ext>
+              </a:extLst>
+            </p:cNvPr>
+            <p:cNvGrpSpPr/>
+            <p:nvPr/>
+          </p:nvGrpSpPr>
+          <p:grpSpPr>
+            <a:xfrm>
+              <a:off x="1258349" y="843093"/>
+              <a:ext cx="2080470" cy="4030908"/>
+              <a:chOff x="1224793" y="956345"/>
+              <a:chExt cx="1677798" cy="3565321"/>
+            </a:xfrm>
+          </p:grpSpPr>
+          <p:sp>
+            <p:nvSpPr>
+              <p:cNvPr id="4" name="Rechteck: abgerundete Ecken 3">
+                <a:extLst>
+                  <a:ext uri="{FF2B5EF4-FFF2-40B4-BE49-F238E27FC236}">
+                    <a16:creationId xmlns:a16="http://schemas.microsoft.com/office/drawing/2014/main" id="{8FAFE8AC-7C85-4D62-B131-0DBEA0D03875}"/>
+                  </a:ext>
+                </a:extLst>
+              </p:cNvPr>
+              <p:cNvSpPr/>
+              <p:nvPr/>
+            </p:nvSpPr>
+            <p:spPr>
+              <a:xfrm>
+                <a:off x="1224793" y="956345"/>
+                <a:ext cx="1677798" cy="3565321"/>
+              </a:xfrm>
+              <a:prstGeom prst="roundRect">
+                <a:avLst/>
+              </a:prstGeom>
+            </p:spPr>
+            <p:style>
+              <a:lnRef idx="2">
+                <a:schemeClr val="accent1">
+                  <a:shade val="50000"/>
+                </a:schemeClr>
+              </a:lnRef>
+              <a:fillRef idx="1">
+                <a:schemeClr val="accent1"/>
+              </a:fillRef>
+              <a:effectRef idx="0">
+                <a:schemeClr val="accent1"/>
+              </a:effectRef>
+              <a:fontRef idx="minor">
+                <a:schemeClr val="lt1"/>
+              </a:fontRef>
+            </p:style>
+            <p:txBody>
+              <a:bodyPr rtlCol="0" anchor="t"/>
+              <a:lstStyle/>
+              <a:p>
+                <a:pPr algn="ctr"/>
+                <a:r>
+                  <a:rPr lang="de-DE" dirty="0"/>
+                  <a:t>Patient 01 – ROI 1</a:t>
+                </a:r>
+              </a:p>
+            </p:txBody>
+          </p:sp>
+          <p:sp>
+            <p:nvSpPr>
+              <p:cNvPr id="9" name="Rechteck: abgerundete Ecken 8">
+                <a:extLst>
+                  <a:ext uri="{FF2B5EF4-FFF2-40B4-BE49-F238E27FC236}">
+                    <a16:creationId xmlns:a16="http://schemas.microsoft.com/office/drawing/2014/main" id="{FE7B439F-E1A2-4C5E-86E5-59709FFADE9E}"/>
+                  </a:ext>
+                </a:extLst>
+              </p:cNvPr>
+              <p:cNvSpPr/>
+              <p:nvPr/>
+            </p:nvSpPr>
+            <p:spPr>
+              <a:xfrm>
+                <a:off x="1368452" y="2543961"/>
+                <a:ext cx="1390477" cy="478173"/>
+              </a:xfrm>
+              <a:prstGeom prst="roundRect">
+                <a:avLst/>
+              </a:prstGeom>
+            </p:spPr>
+            <p:style>
+              <a:lnRef idx="2">
+                <a:schemeClr val="accent5">
+                  <a:shade val="50000"/>
+                </a:schemeClr>
+              </a:lnRef>
+              <a:fillRef idx="1">
+                <a:schemeClr val="accent5"/>
+              </a:fillRef>
+              <a:effectRef idx="0">
+                <a:schemeClr val="accent5"/>
+              </a:effectRef>
+              <a:fontRef idx="minor">
+                <a:schemeClr val="lt1"/>
+              </a:fontRef>
+            </p:style>
+            <p:txBody>
+              <a:bodyPr rtlCol="0" anchor="ctr"/>
+              <a:lstStyle/>
+              <a:p>
+                <a:pPr lvl="0" algn="ctr"/>
+                <a:r>
+                  <a:rPr lang="de-DE" sz="1200" dirty="0">
+                    <a:solidFill>
+                      <a:prstClr val="white"/>
+                    </a:solidFill>
+                  </a:rPr>
+                  <a:t>… 11 weitere Dosen …</a:t>
+                </a:r>
+              </a:p>
+            </p:txBody>
+          </p:sp>
+          <p:grpSp>
+            <p:nvGrpSpPr>
+              <p:cNvPr id="16" name="Gruppieren 15">
+                <a:extLst>
+                  <a:ext uri="{FF2B5EF4-FFF2-40B4-BE49-F238E27FC236}">
+                    <a16:creationId xmlns:a16="http://schemas.microsoft.com/office/drawing/2014/main" id="{468D5136-5AC5-4D60-8DBD-F20F91E28059}"/>
+                  </a:ext>
+                </a:extLst>
+              </p:cNvPr>
+              <p:cNvGrpSpPr/>
+              <p:nvPr/>
+            </p:nvGrpSpPr>
+            <p:grpSpPr>
+              <a:xfrm>
+                <a:off x="1368453" y="1421932"/>
+                <a:ext cx="1390477" cy="1044431"/>
+                <a:chOff x="1368453" y="1421932"/>
+                <a:chExt cx="1390477" cy="1044431"/>
+              </a:xfrm>
+            </p:grpSpPr>
+            <p:sp>
+              <p:nvSpPr>
+                <p:cNvPr id="8" name="Rechteck: abgerundete Ecken 7">
+                  <a:extLst>
+                    <a:ext uri="{FF2B5EF4-FFF2-40B4-BE49-F238E27FC236}">
+                      <a16:creationId xmlns:a16="http://schemas.microsoft.com/office/drawing/2014/main" id="{C90409C3-8D0C-4E89-BAF7-2BAF6920D654}"/>
+                    </a:ext>
+                  </a:extLst>
+                </p:cNvPr>
+                <p:cNvSpPr/>
+                <p:nvPr/>
+              </p:nvSpPr>
+              <p:spPr>
+                <a:xfrm>
+                  <a:off x="1368453" y="1421932"/>
+                  <a:ext cx="1390477" cy="1044431"/>
+                </a:xfrm>
+                <a:prstGeom prst="roundRect">
+                  <a:avLst/>
+                </a:prstGeom>
+              </p:spPr>
+              <p:style>
+                <a:lnRef idx="2">
+                  <a:schemeClr val="accent5">
+                    <a:shade val="50000"/>
+                  </a:schemeClr>
+                </a:lnRef>
+                <a:fillRef idx="1">
+                  <a:schemeClr val="accent5"/>
+                </a:fillRef>
+                <a:effectRef idx="0">
+                  <a:schemeClr val="accent5"/>
+                </a:effectRef>
+                <a:fontRef idx="minor">
+                  <a:schemeClr val="lt1"/>
+                </a:fontRef>
+              </p:style>
+              <p:txBody>
+                <a:bodyPr rtlCol="0" anchor="t"/>
+                <a:lstStyle/>
+                <a:p>
+                  <a:pPr algn="ctr"/>
+                  <a:r>
+                    <a:rPr lang="de-DE" sz="1000" dirty="0"/>
+                    <a:t>Dose 3.5</a:t>
+                  </a:r>
+                </a:p>
+              </p:txBody>
+            </p:sp>
+            <p:sp>
+              <p:nvSpPr>
+                <p:cNvPr id="12" name="Rechteck: abgerundete Ecken 11">
+                  <a:extLst>
+                    <a:ext uri="{FF2B5EF4-FFF2-40B4-BE49-F238E27FC236}">
+                      <a16:creationId xmlns:a16="http://schemas.microsoft.com/office/drawing/2014/main" id="{53C8FB86-682D-4453-87A0-40E8AD09B900}"/>
+                    </a:ext>
+                  </a:extLst>
+                </p:cNvPr>
+                <p:cNvSpPr/>
+                <p:nvPr/>
+              </p:nvSpPr>
+              <p:spPr>
+                <a:xfrm>
+                  <a:off x="1440281" y="1684089"/>
+                  <a:ext cx="547909" cy="260060"/>
+                </a:xfrm>
+                <a:prstGeom prst="roundRect">
+                  <a:avLst/>
+                </a:prstGeom>
+              </p:spPr>
+              <p:style>
+                <a:lnRef idx="2">
+                  <a:schemeClr val="accent4">
+                    <a:shade val="50000"/>
+                  </a:schemeClr>
+                </a:lnRef>
+                <a:fillRef idx="1">
+                  <a:schemeClr val="accent4"/>
+                </a:fillRef>
+                <a:effectRef idx="0">
+                  <a:schemeClr val="accent4"/>
+                </a:effectRef>
+                <a:fontRef idx="minor">
+                  <a:schemeClr val="lt1"/>
+                </a:fontRef>
+              </p:style>
+              <p:txBody>
+                <a:bodyPr rtlCol="0" anchor="ctr"/>
+                <a:lstStyle/>
+                <a:p>
+                  <a:pPr algn="ctr"/>
+                  <a:r>
+                    <a:rPr lang="de-DE" sz="1200" dirty="0">
+                      <a:solidFill>
+                        <a:schemeClr val="tx1"/>
+                      </a:solidFill>
+                    </a:rPr>
+                    <a:t>TF1</a:t>
+                  </a:r>
+                  <a:endParaRPr lang="de-DE" dirty="0">
+                    <a:solidFill>
+                      <a:schemeClr val="tx1"/>
+                    </a:solidFill>
+                  </a:endParaRPr>
+                </a:p>
+              </p:txBody>
+            </p:sp>
+            <p:sp>
+              <p:nvSpPr>
+                <p:cNvPr id="13" name="Rechteck: abgerundete Ecken 12">
+                  <a:extLst>
+                    <a:ext uri="{FF2B5EF4-FFF2-40B4-BE49-F238E27FC236}">
+                      <a16:creationId xmlns:a16="http://schemas.microsoft.com/office/drawing/2014/main" id="{01621A6F-615C-4B7E-B765-EFB03E5AD4A0}"/>
+                    </a:ext>
+                  </a:extLst>
+                </p:cNvPr>
+                <p:cNvSpPr/>
+                <p:nvPr/>
+              </p:nvSpPr>
+              <p:spPr>
+                <a:xfrm>
+                  <a:off x="2060017" y="1684089"/>
+                  <a:ext cx="547909" cy="260060"/>
+                </a:xfrm>
+                <a:prstGeom prst="roundRect">
+                  <a:avLst/>
+                </a:prstGeom>
+              </p:spPr>
+              <p:style>
+                <a:lnRef idx="2">
+                  <a:schemeClr val="accent4">
+                    <a:shade val="50000"/>
+                  </a:schemeClr>
+                </a:lnRef>
+                <a:fillRef idx="1">
+                  <a:schemeClr val="accent4"/>
+                </a:fillRef>
+                <a:effectRef idx="0">
+                  <a:schemeClr val="accent4"/>
+                </a:effectRef>
+                <a:fontRef idx="minor">
+                  <a:schemeClr val="lt1"/>
+                </a:fontRef>
+              </p:style>
+              <p:txBody>
+                <a:bodyPr rtlCol="0" anchor="ctr"/>
+                <a:lstStyle/>
+                <a:p>
+                  <a:pPr algn="ctr"/>
+                  <a:r>
+                    <a:rPr lang="de-DE" sz="1200" dirty="0">
+                      <a:solidFill>
+                        <a:schemeClr val="tx1"/>
+                      </a:solidFill>
+                    </a:rPr>
+                    <a:t>TF2</a:t>
+                  </a:r>
+                  <a:endParaRPr lang="de-DE" dirty="0">
+                    <a:solidFill>
+                      <a:schemeClr val="tx1"/>
+                    </a:solidFill>
+                  </a:endParaRPr>
+                </a:p>
+              </p:txBody>
+            </p:sp>
+            <p:sp>
+              <p:nvSpPr>
+                <p:cNvPr id="14" name="Rechteck: abgerundete Ecken 13">
+                  <a:extLst>
+                    <a:ext uri="{FF2B5EF4-FFF2-40B4-BE49-F238E27FC236}">
+                      <a16:creationId xmlns:a16="http://schemas.microsoft.com/office/drawing/2014/main" id="{EB6480CD-C7A6-4278-B561-953779DE0843}"/>
+                    </a:ext>
+                  </a:extLst>
+                </p:cNvPr>
+                <p:cNvSpPr/>
+                <p:nvPr/>
+              </p:nvSpPr>
+              <p:spPr>
+                <a:xfrm>
+                  <a:off x="1440281" y="2033280"/>
+                  <a:ext cx="547909" cy="260060"/>
+                </a:xfrm>
+                <a:prstGeom prst="roundRect">
+                  <a:avLst/>
+                </a:prstGeom>
+              </p:spPr>
+              <p:style>
+                <a:lnRef idx="2">
+                  <a:schemeClr val="accent4">
+                    <a:shade val="50000"/>
+                  </a:schemeClr>
+                </a:lnRef>
+                <a:fillRef idx="1">
+                  <a:schemeClr val="accent4"/>
+                </a:fillRef>
+                <a:effectRef idx="0">
+                  <a:schemeClr val="accent4"/>
+                </a:effectRef>
+                <a:fontRef idx="minor">
+                  <a:schemeClr val="lt1"/>
+                </a:fontRef>
+              </p:style>
+              <p:txBody>
+                <a:bodyPr rtlCol="0" anchor="ctr"/>
+                <a:lstStyle/>
+                <a:p>
+                  <a:pPr algn="ctr"/>
+                  <a:r>
+                    <a:rPr lang="de-DE" sz="1200" dirty="0">
+                      <a:solidFill>
+                        <a:schemeClr val="tx1"/>
+                      </a:solidFill>
+                    </a:rPr>
+                    <a:t>…</a:t>
+                  </a:r>
+                  <a:endParaRPr lang="de-DE" dirty="0">
+                    <a:solidFill>
+                      <a:schemeClr val="tx1"/>
+                    </a:solidFill>
+                  </a:endParaRPr>
+                </a:p>
+              </p:txBody>
+            </p:sp>
+            <p:sp>
+              <p:nvSpPr>
+                <p:cNvPr id="15" name="Rechteck: abgerundete Ecken 14">
+                  <a:extLst>
+                    <a:ext uri="{FF2B5EF4-FFF2-40B4-BE49-F238E27FC236}">
+                      <a16:creationId xmlns:a16="http://schemas.microsoft.com/office/drawing/2014/main" id="{5B07FBAE-40C5-4675-B251-9FE21340A298}"/>
+                    </a:ext>
+                  </a:extLst>
+                </p:cNvPr>
+                <p:cNvSpPr/>
+                <p:nvPr/>
+              </p:nvSpPr>
+              <p:spPr>
+                <a:xfrm>
+                  <a:off x="2060017" y="2036426"/>
+                  <a:ext cx="547909" cy="260060"/>
+                </a:xfrm>
+                <a:prstGeom prst="roundRect">
+                  <a:avLst/>
+                </a:prstGeom>
+              </p:spPr>
+              <p:style>
+                <a:lnRef idx="2">
+                  <a:schemeClr val="accent4">
+                    <a:shade val="50000"/>
+                  </a:schemeClr>
+                </a:lnRef>
+                <a:fillRef idx="1">
+                  <a:schemeClr val="accent4"/>
+                </a:fillRef>
+                <a:effectRef idx="0">
+                  <a:schemeClr val="accent4"/>
+                </a:effectRef>
+                <a:fontRef idx="minor">
+                  <a:schemeClr val="lt1"/>
+                </a:fontRef>
+              </p:style>
+              <p:txBody>
+                <a:bodyPr rtlCol="0" anchor="ctr"/>
+                <a:lstStyle/>
+                <a:p>
+                  <a:pPr algn="ctr"/>
+                  <a:r>
+                    <a:rPr lang="de-DE" sz="1200" dirty="0">
+                      <a:solidFill>
+                        <a:schemeClr val="tx1"/>
+                      </a:solidFill>
+                    </a:rPr>
+                    <a:t>TF42</a:t>
+                  </a:r>
+                  <a:endParaRPr lang="de-DE" dirty="0">
+                    <a:solidFill>
+                      <a:schemeClr val="tx1"/>
+                    </a:solidFill>
+                  </a:endParaRPr>
+                </a:p>
+              </p:txBody>
+            </p:sp>
+          </p:grpSp>
+          <p:grpSp>
+            <p:nvGrpSpPr>
+              <p:cNvPr id="17" name="Gruppieren 16">
+                <a:extLst>
+                  <a:ext uri="{FF2B5EF4-FFF2-40B4-BE49-F238E27FC236}">
+                    <a16:creationId xmlns:a16="http://schemas.microsoft.com/office/drawing/2014/main" id="{2FD86F3D-6D9D-4959-9F3F-C25DD16E508C}"/>
+                  </a:ext>
+                </a:extLst>
+              </p:cNvPr>
+              <p:cNvGrpSpPr/>
+              <p:nvPr/>
+            </p:nvGrpSpPr>
+            <p:grpSpPr>
+              <a:xfrm>
+                <a:off x="1364778" y="3099732"/>
+                <a:ext cx="1390477" cy="1044431"/>
+                <a:chOff x="1368453" y="1421932"/>
+                <a:chExt cx="1390477" cy="1044431"/>
+              </a:xfrm>
+            </p:grpSpPr>
+            <p:sp>
+              <p:nvSpPr>
+                <p:cNvPr id="18" name="Rechteck: abgerundete Ecken 17">
+                  <a:extLst>
+                    <a:ext uri="{FF2B5EF4-FFF2-40B4-BE49-F238E27FC236}">
+                      <a16:creationId xmlns:a16="http://schemas.microsoft.com/office/drawing/2014/main" id="{ABD0B937-FDA7-4819-9511-1B8EB3035FD0}"/>
+                    </a:ext>
+                  </a:extLst>
+                </p:cNvPr>
+                <p:cNvSpPr/>
+                <p:nvPr/>
+              </p:nvSpPr>
+              <p:spPr>
+                <a:xfrm>
+                  <a:off x="1368453" y="1421932"/>
+                  <a:ext cx="1390477" cy="1044431"/>
+                </a:xfrm>
+                <a:prstGeom prst="roundRect">
+                  <a:avLst/>
+                </a:prstGeom>
+              </p:spPr>
+              <p:style>
+                <a:lnRef idx="2">
+                  <a:schemeClr val="accent5">
+                    <a:shade val="50000"/>
+                  </a:schemeClr>
+                </a:lnRef>
+                <a:fillRef idx="1">
+                  <a:schemeClr val="accent5"/>
+                </a:fillRef>
+                <a:effectRef idx="0">
+                  <a:schemeClr val="accent5"/>
+                </a:effectRef>
+                <a:fontRef idx="minor">
+                  <a:schemeClr val="lt1"/>
+                </a:fontRef>
+              </p:style>
+              <p:txBody>
+                <a:bodyPr rtlCol="0" anchor="t"/>
+                <a:lstStyle/>
+                <a:p>
+                  <a:pPr algn="ctr"/>
+                  <a:r>
+                    <a:rPr lang="de-DE" sz="1000" dirty="0"/>
+                    <a:t>Dose 0.5</a:t>
+                  </a:r>
+                </a:p>
+              </p:txBody>
+            </p:sp>
+            <p:sp>
+              <p:nvSpPr>
+                <p:cNvPr id="19" name="Rechteck: abgerundete Ecken 18">
+                  <a:extLst>
+                    <a:ext uri="{FF2B5EF4-FFF2-40B4-BE49-F238E27FC236}">
+                      <a16:creationId xmlns:a16="http://schemas.microsoft.com/office/drawing/2014/main" id="{A68AC7ED-DBC3-4B75-9E20-8820FE2B2DB5}"/>
+                    </a:ext>
+                  </a:extLst>
+                </p:cNvPr>
+                <p:cNvSpPr/>
+                <p:nvPr/>
+              </p:nvSpPr>
+              <p:spPr>
+                <a:xfrm>
+                  <a:off x="1440281" y="1684089"/>
+                  <a:ext cx="547909" cy="260060"/>
+                </a:xfrm>
+                <a:prstGeom prst="roundRect">
+                  <a:avLst/>
+                </a:prstGeom>
+              </p:spPr>
+              <p:style>
+                <a:lnRef idx="2">
+                  <a:schemeClr val="accent4">
+                    <a:shade val="50000"/>
+                  </a:schemeClr>
+                </a:lnRef>
+                <a:fillRef idx="1">
+                  <a:schemeClr val="accent4"/>
+                </a:fillRef>
+                <a:effectRef idx="0">
+                  <a:schemeClr val="accent4"/>
+                </a:effectRef>
+                <a:fontRef idx="minor">
+                  <a:schemeClr val="lt1"/>
+                </a:fontRef>
+              </p:style>
+              <p:txBody>
+                <a:bodyPr rtlCol="0" anchor="ctr"/>
+                <a:lstStyle/>
+                <a:p>
+                  <a:pPr algn="ctr"/>
+                  <a:r>
+                    <a:rPr lang="de-DE" sz="1200" dirty="0">
+                      <a:solidFill>
+                        <a:schemeClr val="tx1"/>
+                      </a:solidFill>
+                    </a:rPr>
+                    <a:t>TF1</a:t>
+                  </a:r>
+                  <a:endParaRPr lang="de-DE" dirty="0">
+                    <a:solidFill>
+                      <a:schemeClr val="tx1"/>
+                    </a:solidFill>
+                  </a:endParaRPr>
+                </a:p>
+              </p:txBody>
+            </p:sp>
+            <p:sp>
+              <p:nvSpPr>
+                <p:cNvPr id="20" name="Rechteck: abgerundete Ecken 19">
+                  <a:extLst>
+                    <a:ext uri="{FF2B5EF4-FFF2-40B4-BE49-F238E27FC236}">
+                      <a16:creationId xmlns:a16="http://schemas.microsoft.com/office/drawing/2014/main" id="{5DF4B9FC-9F51-4CB3-8FBC-6EA44219F151}"/>
+                    </a:ext>
+                  </a:extLst>
+                </p:cNvPr>
+                <p:cNvSpPr/>
+                <p:nvPr/>
+              </p:nvSpPr>
+              <p:spPr>
+                <a:xfrm>
+                  <a:off x="2060017" y="1684089"/>
+                  <a:ext cx="547909" cy="260060"/>
+                </a:xfrm>
+                <a:prstGeom prst="roundRect">
+                  <a:avLst/>
+                </a:prstGeom>
+              </p:spPr>
+              <p:style>
+                <a:lnRef idx="2">
+                  <a:schemeClr val="accent4">
+                    <a:shade val="50000"/>
+                  </a:schemeClr>
+                </a:lnRef>
+                <a:fillRef idx="1">
+                  <a:schemeClr val="accent4"/>
+                </a:fillRef>
+                <a:effectRef idx="0">
+                  <a:schemeClr val="accent4"/>
+                </a:effectRef>
+                <a:fontRef idx="minor">
+                  <a:schemeClr val="lt1"/>
+                </a:fontRef>
+              </p:style>
+              <p:txBody>
+                <a:bodyPr rtlCol="0" anchor="ctr"/>
+                <a:lstStyle/>
+                <a:p>
+                  <a:pPr algn="ctr"/>
+                  <a:r>
+                    <a:rPr lang="de-DE" sz="1200" dirty="0">
+                      <a:solidFill>
+                        <a:schemeClr val="tx1"/>
+                      </a:solidFill>
+                    </a:rPr>
+                    <a:t>TF2</a:t>
+                  </a:r>
+                  <a:endParaRPr lang="de-DE" dirty="0">
+                    <a:solidFill>
+                      <a:schemeClr val="tx1"/>
+                    </a:solidFill>
+                  </a:endParaRPr>
+                </a:p>
+              </p:txBody>
+            </p:sp>
+            <p:sp>
+              <p:nvSpPr>
+                <p:cNvPr id="21" name="Rechteck: abgerundete Ecken 20">
+                  <a:extLst>
+                    <a:ext uri="{FF2B5EF4-FFF2-40B4-BE49-F238E27FC236}">
+                      <a16:creationId xmlns:a16="http://schemas.microsoft.com/office/drawing/2014/main" id="{0E0F4350-28C2-438F-92E2-7819A4BBFBAB}"/>
+                    </a:ext>
+                  </a:extLst>
+                </p:cNvPr>
+                <p:cNvSpPr/>
+                <p:nvPr/>
+              </p:nvSpPr>
+              <p:spPr>
+                <a:xfrm>
+                  <a:off x="1440281" y="2033280"/>
+                  <a:ext cx="547909" cy="260060"/>
+                </a:xfrm>
+                <a:prstGeom prst="roundRect">
+                  <a:avLst/>
+                </a:prstGeom>
+              </p:spPr>
+              <p:style>
+                <a:lnRef idx="2">
+                  <a:schemeClr val="accent4">
+                    <a:shade val="50000"/>
+                  </a:schemeClr>
+                </a:lnRef>
+                <a:fillRef idx="1">
+                  <a:schemeClr val="accent4"/>
+                </a:fillRef>
+                <a:effectRef idx="0">
+                  <a:schemeClr val="accent4"/>
+                </a:effectRef>
+                <a:fontRef idx="minor">
+                  <a:schemeClr val="lt1"/>
+                </a:fontRef>
+              </p:style>
+              <p:txBody>
+                <a:bodyPr rtlCol="0" anchor="ctr"/>
+                <a:lstStyle/>
+                <a:p>
+                  <a:pPr algn="ctr"/>
+                  <a:r>
+                    <a:rPr lang="de-DE" sz="1200" dirty="0">
+                      <a:solidFill>
+                        <a:schemeClr val="tx1"/>
+                      </a:solidFill>
+                    </a:rPr>
+                    <a:t>…</a:t>
+                  </a:r>
+                  <a:endParaRPr lang="de-DE" dirty="0">
+                    <a:solidFill>
+                      <a:schemeClr val="tx1"/>
+                    </a:solidFill>
+                  </a:endParaRPr>
+                </a:p>
+              </p:txBody>
+            </p:sp>
+            <p:sp>
+              <p:nvSpPr>
+                <p:cNvPr id="22" name="Rechteck: abgerundete Ecken 21">
+                  <a:extLst>
+                    <a:ext uri="{FF2B5EF4-FFF2-40B4-BE49-F238E27FC236}">
+                      <a16:creationId xmlns:a16="http://schemas.microsoft.com/office/drawing/2014/main" id="{BB08483E-354B-44FB-8D36-E542A62BAE4D}"/>
+                    </a:ext>
+                  </a:extLst>
+                </p:cNvPr>
+                <p:cNvSpPr/>
+                <p:nvPr/>
+              </p:nvSpPr>
+              <p:spPr>
+                <a:xfrm>
+                  <a:off x="2060017" y="2036426"/>
+                  <a:ext cx="547909" cy="260060"/>
+                </a:xfrm>
+                <a:prstGeom prst="roundRect">
+                  <a:avLst/>
+                </a:prstGeom>
+              </p:spPr>
+              <p:style>
+                <a:lnRef idx="2">
+                  <a:schemeClr val="accent4">
+                    <a:shade val="50000"/>
+                  </a:schemeClr>
+                </a:lnRef>
+                <a:fillRef idx="1">
+                  <a:schemeClr val="accent4"/>
+                </a:fillRef>
+                <a:effectRef idx="0">
+                  <a:schemeClr val="accent4"/>
+                </a:effectRef>
+                <a:fontRef idx="minor">
+                  <a:schemeClr val="lt1"/>
+                </a:fontRef>
+              </p:style>
+              <p:txBody>
+                <a:bodyPr rtlCol="0" anchor="ctr"/>
+                <a:lstStyle/>
+                <a:p>
+                  <a:pPr algn="ctr"/>
+                  <a:r>
+                    <a:rPr lang="de-DE" sz="1200" dirty="0">
+                      <a:solidFill>
+                        <a:schemeClr val="tx1"/>
+                      </a:solidFill>
+                    </a:rPr>
+                    <a:t>TF42</a:t>
+                  </a:r>
+                  <a:endParaRPr lang="de-DE" dirty="0">
+                    <a:solidFill>
+                      <a:schemeClr val="tx1"/>
+                    </a:solidFill>
+                  </a:endParaRPr>
+                </a:p>
+              </p:txBody>
+            </p:sp>
+          </p:grpSp>
+        </p:grpSp>
+        <p:grpSp>
+          <p:nvGrpSpPr>
+            <p:cNvPr id="54" name="Gruppieren 53">
+              <a:extLst>
+                <a:ext uri="{FF2B5EF4-FFF2-40B4-BE49-F238E27FC236}">
+                  <a16:creationId xmlns:a16="http://schemas.microsoft.com/office/drawing/2014/main" id="{56E947F7-E032-4850-B2E8-F3C86960BD69}"/>
+                </a:ext>
+              </a:extLst>
+            </p:cNvPr>
+            <p:cNvGrpSpPr/>
+            <p:nvPr/>
+          </p:nvGrpSpPr>
+          <p:grpSpPr>
+            <a:xfrm>
+              <a:off x="3749879" y="843093"/>
+              <a:ext cx="2080470" cy="4030908"/>
+              <a:chOff x="1224793" y="956345"/>
+              <a:chExt cx="1677798" cy="3565321"/>
+            </a:xfrm>
+          </p:grpSpPr>
+          <p:sp>
+            <p:nvSpPr>
+              <p:cNvPr id="55" name="Rechteck: abgerundete Ecken 54">
+                <a:extLst>
+                  <a:ext uri="{FF2B5EF4-FFF2-40B4-BE49-F238E27FC236}">
+                    <a16:creationId xmlns:a16="http://schemas.microsoft.com/office/drawing/2014/main" id="{B9AAE8AF-4DB9-4225-8F6D-98AE03574BB9}"/>
+                  </a:ext>
+                </a:extLst>
+              </p:cNvPr>
+              <p:cNvSpPr/>
+              <p:nvPr/>
+            </p:nvSpPr>
+            <p:spPr>
+              <a:xfrm>
+                <a:off x="1224793" y="956345"/>
+                <a:ext cx="1677798" cy="3565321"/>
+              </a:xfrm>
+              <a:prstGeom prst="roundRect">
+                <a:avLst/>
+              </a:prstGeom>
+            </p:spPr>
+            <p:style>
+              <a:lnRef idx="2">
+                <a:schemeClr val="accent1">
+                  <a:shade val="50000"/>
+                </a:schemeClr>
+              </a:lnRef>
+              <a:fillRef idx="1">
+                <a:schemeClr val="accent1"/>
+              </a:fillRef>
+              <a:effectRef idx="0">
+                <a:schemeClr val="accent1"/>
+              </a:effectRef>
+              <a:fontRef idx="minor">
+                <a:schemeClr val="lt1"/>
+              </a:fontRef>
+            </p:style>
+            <p:txBody>
+              <a:bodyPr rtlCol="0" anchor="t"/>
+              <a:lstStyle/>
+              <a:p>
+                <a:pPr algn="ctr"/>
+                <a:r>
+                  <a:rPr lang="de-DE" dirty="0"/>
+                  <a:t>Patient 03 – ROI 1</a:t>
+                </a:r>
+              </a:p>
+            </p:txBody>
+          </p:sp>
+          <p:sp>
+            <p:nvSpPr>
+              <p:cNvPr id="56" name="Rechteck: abgerundete Ecken 55">
+                <a:extLst>
+                  <a:ext uri="{FF2B5EF4-FFF2-40B4-BE49-F238E27FC236}">
+                    <a16:creationId xmlns:a16="http://schemas.microsoft.com/office/drawing/2014/main" id="{7BD72794-080E-46B2-907C-E5701BC74A9F}"/>
+                  </a:ext>
+                </a:extLst>
+              </p:cNvPr>
+              <p:cNvSpPr/>
+              <p:nvPr/>
+            </p:nvSpPr>
+            <p:spPr>
+              <a:xfrm>
+                <a:off x="1368452" y="2543961"/>
+                <a:ext cx="1390477" cy="478173"/>
+              </a:xfrm>
+              <a:prstGeom prst="roundRect">
+                <a:avLst/>
+              </a:prstGeom>
+            </p:spPr>
+            <p:style>
+              <a:lnRef idx="2">
+                <a:schemeClr val="accent5">
+                  <a:shade val="50000"/>
+                </a:schemeClr>
+              </a:lnRef>
+              <a:fillRef idx="1">
+                <a:schemeClr val="accent5"/>
+              </a:fillRef>
+              <a:effectRef idx="0">
+                <a:schemeClr val="accent5"/>
+              </a:effectRef>
+              <a:fontRef idx="minor">
+                <a:schemeClr val="lt1"/>
+              </a:fontRef>
+            </p:style>
+            <p:txBody>
+              <a:bodyPr rtlCol="0" anchor="ctr"/>
+              <a:lstStyle/>
+              <a:p>
+                <a:pPr lvl="0" algn="ctr"/>
+                <a:r>
+                  <a:rPr lang="de-DE" sz="1200" dirty="0">
+                    <a:solidFill>
+                      <a:prstClr val="white"/>
+                    </a:solidFill>
+                  </a:rPr>
+                  <a:t>… 11 weitere Dosen …</a:t>
+                </a:r>
+              </a:p>
+            </p:txBody>
+          </p:sp>
+          <p:grpSp>
+            <p:nvGrpSpPr>
+              <p:cNvPr id="57" name="Gruppieren 56">
+                <a:extLst>
+                  <a:ext uri="{FF2B5EF4-FFF2-40B4-BE49-F238E27FC236}">
+                    <a16:creationId xmlns:a16="http://schemas.microsoft.com/office/drawing/2014/main" id="{56DA3584-CFCF-4E0F-97B3-AE975DBFEF5C}"/>
+                  </a:ext>
+                </a:extLst>
+              </p:cNvPr>
+              <p:cNvGrpSpPr/>
+              <p:nvPr/>
+            </p:nvGrpSpPr>
+            <p:grpSpPr>
+              <a:xfrm>
+                <a:off x="1368453" y="1421932"/>
+                <a:ext cx="1390477" cy="1044431"/>
+                <a:chOff x="1368453" y="1421932"/>
+                <a:chExt cx="1390477" cy="1044431"/>
+              </a:xfrm>
+            </p:grpSpPr>
+            <p:sp>
+              <p:nvSpPr>
+                <p:cNvPr id="64" name="Rechteck: abgerundete Ecken 63">
+                  <a:extLst>
+                    <a:ext uri="{FF2B5EF4-FFF2-40B4-BE49-F238E27FC236}">
+                      <a16:creationId xmlns:a16="http://schemas.microsoft.com/office/drawing/2014/main" id="{16F3EA2C-ED23-4FAA-A787-8370D1218316}"/>
+                    </a:ext>
+                  </a:extLst>
+                </p:cNvPr>
+                <p:cNvSpPr/>
+                <p:nvPr/>
+              </p:nvSpPr>
+              <p:spPr>
+                <a:xfrm>
+                  <a:off x="1368453" y="1421932"/>
+                  <a:ext cx="1390477" cy="1044431"/>
+                </a:xfrm>
+                <a:prstGeom prst="roundRect">
+                  <a:avLst/>
+                </a:prstGeom>
+              </p:spPr>
+              <p:style>
+                <a:lnRef idx="2">
+                  <a:schemeClr val="accent5">
+                    <a:shade val="50000"/>
+                  </a:schemeClr>
+                </a:lnRef>
+                <a:fillRef idx="1">
+                  <a:schemeClr val="accent5"/>
+                </a:fillRef>
+                <a:effectRef idx="0">
+                  <a:schemeClr val="accent5"/>
+                </a:effectRef>
+                <a:fontRef idx="minor">
+                  <a:schemeClr val="lt1"/>
+                </a:fontRef>
+              </p:style>
+              <p:txBody>
+                <a:bodyPr rtlCol="0" anchor="t"/>
+                <a:lstStyle/>
+                <a:p>
+                  <a:pPr algn="ctr"/>
+                  <a:r>
+                    <a:rPr lang="de-DE" sz="1000" dirty="0"/>
+                    <a:t>Dose 3.5</a:t>
+                  </a:r>
+                </a:p>
+              </p:txBody>
+            </p:sp>
+            <p:sp>
+              <p:nvSpPr>
+                <p:cNvPr id="65" name="Rechteck: abgerundete Ecken 64">
+                  <a:extLst>
+                    <a:ext uri="{FF2B5EF4-FFF2-40B4-BE49-F238E27FC236}">
+                      <a16:creationId xmlns:a16="http://schemas.microsoft.com/office/drawing/2014/main" id="{A272C3B8-A7C2-4BB1-A926-8621884A030C}"/>
+                    </a:ext>
+                  </a:extLst>
+                </p:cNvPr>
+                <p:cNvSpPr/>
+                <p:nvPr/>
+              </p:nvSpPr>
+              <p:spPr>
+                <a:xfrm>
+                  <a:off x="1440281" y="1684089"/>
+                  <a:ext cx="547909" cy="260060"/>
+                </a:xfrm>
+                <a:prstGeom prst="roundRect">
+                  <a:avLst/>
+                </a:prstGeom>
+              </p:spPr>
+              <p:style>
+                <a:lnRef idx="2">
+                  <a:schemeClr val="accent4">
+                    <a:shade val="50000"/>
+                  </a:schemeClr>
+                </a:lnRef>
+                <a:fillRef idx="1">
+                  <a:schemeClr val="accent4"/>
+                </a:fillRef>
+                <a:effectRef idx="0">
+                  <a:schemeClr val="accent4"/>
+                </a:effectRef>
+                <a:fontRef idx="minor">
+                  <a:schemeClr val="lt1"/>
+                </a:fontRef>
+              </p:style>
+              <p:txBody>
+                <a:bodyPr rtlCol="0" anchor="ctr"/>
+                <a:lstStyle/>
+                <a:p>
+                  <a:pPr algn="ctr"/>
+                  <a:r>
+                    <a:rPr lang="de-DE" sz="1200" dirty="0">
+                      <a:solidFill>
+                        <a:schemeClr val="tx1"/>
+                      </a:solidFill>
+                    </a:rPr>
+                    <a:t>TF1</a:t>
+                  </a:r>
+                  <a:endParaRPr lang="de-DE" dirty="0">
+                    <a:solidFill>
+                      <a:schemeClr val="tx1"/>
+                    </a:solidFill>
+                  </a:endParaRPr>
+                </a:p>
+              </p:txBody>
+            </p:sp>
+            <p:sp>
+              <p:nvSpPr>
+                <p:cNvPr id="66" name="Rechteck: abgerundete Ecken 65">
+                  <a:extLst>
+                    <a:ext uri="{FF2B5EF4-FFF2-40B4-BE49-F238E27FC236}">
+                      <a16:creationId xmlns:a16="http://schemas.microsoft.com/office/drawing/2014/main" id="{450F57EB-F8FE-4B9E-B3EF-67AEB70A4AB4}"/>
+                    </a:ext>
+                  </a:extLst>
+                </p:cNvPr>
+                <p:cNvSpPr/>
+                <p:nvPr/>
+              </p:nvSpPr>
+              <p:spPr>
+                <a:xfrm>
+                  <a:off x="2060017" y="1684089"/>
+                  <a:ext cx="547909" cy="260060"/>
+                </a:xfrm>
+                <a:prstGeom prst="roundRect">
+                  <a:avLst/>
+                </a:prstGeom>
+              </p:spPr>
+              <p:style>
+                <a:lnRef idx="2">
+                  <a:schemeClr val="accent4">
+                    <a:shade val="50000"/>
+                  </a:schemeClr>
+                </a:lnRef>
+                <a:fillRef idx="1">
+                  <a:schemeClr val="accent4"/>
+                </a:fillRef>
+                <a:effectRef idx="0">
+                  <a:schemeClr val="accent4"/>
+                </a:effectRef>
+                <a:fontRef idx="minor">
+                  <a:schemeClr val="lt1"/>
+                </a:fontRef>
+              </p:style>
+              <p:txBody>
+                <a:bodyPr rtlCol="0" anchor="ctr"/>
+                <a:lstStyle/>
+                <a:p>
+                  <a:pPr algn="ctr"/>
+                  <a:r>
+                    <a:rPr lang="de-DE" sz="1200" dirty="0">
+                      <a:solidFill>
+                        <a:schemeClr val="tx1"/>
+                      </a:solidFill>
+                    </a:rPr>
+                    <a:t>TF2</a:t>
+                  </a:r>
+                  <a:endParaRPr lang="de-DE" dirty="0">
+                    <a:solidFill>
+                      <a:schemeClr val="tx1"/>
+                    </a:solidFill>
+                  </a:endParaRPr>
+                </a:p>
+              </p:txBody>
+            </p:sp>
+            <p:sp>
+              <p:nvSpPr>
+                <p:cNvPr id="67" name="Rechteck: abgerundete Ecken 66">
+                  <a:extLst>
+                    <a:ext uri="{FF2B5EF4-FFF2-40B4-BE49-F238E27FC236}">
+                      <a16:creationId xmlns:a16="http://schemas.microsoft.com/office/drawing/2014/main" id="{D45269C9-BF44-4BCD-AB49-68AAACD943FB}"/>
+                    </a:ext>
+                  </a:extLst>
+                </p:cNvPr>
+                <p:cNvSpPr/>
+                <p:nvPr/>
+              </p:nvSpPr>
+              <p:spPr>
+                <a:xfrm>
+                  <a:off x="1440281" y="2033280"/>
+                  <a:ext cx="547909" cy="260060"/>
+                </a:xfrm>
+                <a:prstGeom prst="roundRect">
+                  <a:avLst/>
+                </a:prstGeom>
+              </p:spPr>
+              <p:style>
+                <a:lnRef idx="2">
+                  <a:schemeClr val="accent4">
+                    <a:shade val="50000"/>
+                  </a:schemeClr>
+                </a:lnRef>
+                <a:fillRef idx="1">
+                  <a:schemeClr val="accent4"/>
+                </a:fillRef>
+                <a:effectRef idx="0">
+                  <a:schemeClr val="accent4"/>
+                </a:effectRef>
+                <a:fontRef idx="minor">
+                  <a:schemeClr val="lt1"/>
+                </a:fontRef>
+              </p:style>
+              <p:txBody>
+                <a:bodyPr rtlCol="0" anchor="ctr"/>
+                <a:lstStyle/>
+                <a:p>
+                  <a:pPr algn="ctr"/>
+                  <a:r>
+                    <a:rPr lang="de-DE" sz="1200" dirty="0">
+                      <a:solidFill>
+                        <a:schemeClr val="tx1"/>
+                      </a:solidFill>
+                    </a:rPr>
+                    <a:t>…</a:t>
+                  </a:r>
+                  <a:endParaRPr lang="de-DE" dirty="0">
+                    <a:solidFill>
+                      <a:schemeClr val="tx1"/>
+                    </a:solidFill>
+                  </a:endParaRPr>
+                </a:p>
+              </p:txBody>
+            </p:sp>
+            <p:sp>
+              <p:nvSpPr>
+                <p:cNvPr id="68" name="Rechteck: abgerundete Ecken 67">
+                  <a:extLst>
+                    <a:ext uri="{FF2B5EF4-FFF2-40B4-BE49-F238E27FC236}">
+                      <a16:creationId xmlns:a16="http://schemas.microsoft.com/office/drawing/2014/main" id="{9398ADDC-A53E-48DE-9C96-54BEA063351B}"/>
+                    </a:ext>
+                  </a:extLst>
+                </p:cNvPr>
+                <p:cNvSpPr/>
+                <p:nvPr/>
+              </p:nvSpPr>
+              <p:spPr>
+                <a:xfrm>
+                  <a:off x="2060017" y="2036426"/>
+                  <a:ext cx="547909" cy="260060"/>
+                </a:xfrm>
+                <a:prstGeom prst="roundRect">
+                  <a:avLst/>
+                </a:prstGeom>
+              </p:spPr>
+              <p:style>
+                <a:lnRef idx="2">
+                  <a:schemeClr val="accent4">
+                    <a:shade val="50000"/>
+                  </a:schemeClr>
+                </a:lnRef>
+                <a:fillRef idx="1">
+                  <a:schemeClr val="accent4"/>
+                </a:fillRef>
+                <a:effectRef idx="0">
+                  <a:schemeClr val="accent4"/>
+                </a:effectRef>
+                <a:fontRef idx="minor">
+                  <a:schemeClr val="lt1"/>
+                </a:fontRef>
+              </p:style>
+              <p:txBody>
+                <a:bodyPr rtlCol="0" anchor="ctr"/>
+                <a:lstStyle/>
+                <a:p>
+                  <a:pPr algn="ctr"/>
+                  <a:r>
+                    <a:rPr lang="de-DE" sz="1200" dirty="0">
+                      <a:solidFill>
+                        <a:schemeClr val="tx1"/>
+                      </a:solidFill>
+                    </a:rPr>
+                    <a:t>TF42</a:t>
+                  </a:r>
+                  <a:endParaRPr lang="de-DE" dirty="0">
+                    <a:solidFill>
+                      <a:schemeClr val="tx1"/>
+                    </a:solidFill>
+                  </a:endParaRPr>
+                </a:p>
+              </p:txBody>
+            </p:sp>
+          </p:grpSp>
+          <p:grpSp>
+            <p:nvGrpSpPr>
+              <p:cNvPr id="58" name="Gruppieren 57">
+                <a:extLst>
+                  <a:ext uri="{FF2B5EF4-FFF2-40B4-BE49-F238E27FC236}">
+                    <a16:creationId xmlns:a16="http://schemas.microsoft.com/office/drawing/2014/main" id="{8F77A783-7F7F-4C54-9A98-BFEC0424E16C}"/>
+                  </a:ext>
+                </a:extLst>
+              </p:cNvPr>
+              <p:cNvGrpSpPr/>
+              <p:nvPr/>
+            </p:nvGrpSpPr>
+            <p:grpSpPr>
+              <a:xfrm>
+                <a:off x="1364778" y="3099732"/>
+                <a:ext cx="1390477" cy="1044431"/>
+                <a:chOff x="1368453" y="1421932"/>
+                <a:chExt cx="1390477" cy="1044431"/>
+              </a:xfrm>
+            </p:grpSpPr>
+            <p:sp>
+              <p:nvSpPr>
+                <p:cNvPr id="59" name="Rechteck: abgerundete Ecken 58">
+                  <a:extLst>
+                    <a:ext uri="{FF2B5EF4-FFF2-40B4-BE49-F238E27FC236}">
+                      <a16:creationId xmlns:a16="http://schemas.microsoft.com/office/drawing/2014/main" id="{A0C781E4-92C5-45EB-9F14-BB342524F2AA}"/>
+                    </a:ext>
+                  </a:extLst>
+                </p:cNvPr>
+                <p:cNvSpPr/>
+                <p:nvPr/>
+              </p:nvSpPr>
+              <p:spPr>
+                <a:xfrm>
+                  <a:off x="1368453" y="1421932"/>
+                  <a:ext cx="1390477" cy="1044431"/>
+                </a:xfrm>
+                <a:prstGeom prst="roundRect">
+                  <a:avLst/>
+                </a:prstGeom>
+              </p:spPr>
+              <p:style>
+                <a:lnRef idx="2">
+                  <a:schemeClr val="accent5">
+                    <a:shade val="50000"/>
+                  </a:schemeClr>
+                </a:lnRef>
+                <a:fillRef idx="1">
+                  <a:schemeClr val="accent5"/>
+                </a:fillRef>
+                <a:effectRef idx="0">
+                  <a:schemeClr val="accent5"/>
+                </a:effectRef>
+                <a:fontRef idx="minor">
+                  <a:schemeClr val="lt1"/>
+                </a:fontRef>
+              </p:style>
+              <p:txBody>
+                <a:bodyPr rtlCol="0" anchor="t"/>
+                <a:lstStyle/>
+                <a:p>
+                  <a:pPr algn="ctr"/>
+                  <a:r>
+                    <a:rPr lang="de-DE" sz="1000" dirty="0"/>
+                    <a:t>Dose 0.5</a:t>
+                  </a:r>
+                </a:p>
+              </p:txBody>
+            </p:sp>
+            <p:sp>
+              <p:nvSpPr>
+                <p:cNvPr id="60" name="Rechteck: abgerundete Ecken 59">
+                  <a:extLst>
+                    <a:ext uri="{FF2B5EF4-FFF2-40B4-BE49-F238E27FC236}">
+                      <a16:creationId xmlns:a16="http://schemas.microsoft.com/office/drawing/2014/main" id="{55070ED3-B2B0-4A9E-8C3E-4472B7BD41C2}"/>
+                    </a:ext>
+                  </a:extLst>
+                </p:cNvPr>
+                <p:cNvSpPr/>
+                <p:nvPr/>
+              </p:nvSpPr>
+              <p:spPr>
+                <a:xfrm>
+                  <a:off x="1440281" y="1684089"/>
+                  <a:ext cx="547909" cy="260060"/>
+                </a:xfrm>
+                <a:prstGeom prst="roundRect">
+                  <a:avLst/>
+                </a:prstGeom>
+              </p:spPr>
+              <p:style>
+                <a:lnRef idx="2">
+                  <a:schemeClr val="accent4">
+                    <a:shade val="50000"/>
+                  </a:schemeClr>
+                </a:lnRef>
+                <a:fillRef idx="1">
+                  <a:schemeClr val="accent4"/>
+                </a:fillRef>
+                <a:effectRef idx="0">
+                  <a:schemeClr val="accent4"/>
+                </a:effectRef>
+                <a:fontRef idx="minor">
+                  <a:schemeClr val="lt1"/>
+                </a:fontRef>
+              </p:style>
+              <p:txBody>
+                <a:bodyPr rtlCol="0" anchor="ctr"/>
+                <a:lstStyle/>
+                <a:p>
+                  <a:pPr algn="ctr"/>
+                  <a:r>
+                    <a:rPr lang="de-DE" sz="1200" dirty="0">
+                      <a:solidFill>
+                        <a:schemeClr val="tx1"/>
+                      </a:solidFill>
+                    </a:rPr>
+                    <a:t>TF1</a:t>
+                  </a:r>
+                  <a:endParaRPr lang="de-DE" dirty="0">
+                    <a:solidFill>
+                      <a:schemeClr val="tx1"/>
+                    </a:solidFill>
+                  </a:endParaRPr>
+                </a:p>
+              </p:txBody>
+            </p:sp>
+            <p:sp>
+              <p:nvSpPr>
+                <p:cNvPr id="61" name="Rechteck: abgerundete Ecken 60">
+                  <a:extLst>
+                    <a:ext uri="{FF2B5EF4-FFF2-40B4-BE49-F238E27FC236}">
+                      <a16:creationId xmlns:a16="http://schemas.microsoft.com/office/drawing/2014/main" id="{A339BF6E-362F-4FD6-91D8-705CBF4E75C1}"/>
+                    </a:ext>
+                  </a:extLst>
+                </p:cNvPr>
+                <p:cNvSpPr/>
+                <p:nvPr/>
+              </p:nvSpPr>
+              <p:spPr>
+                <a:xfrm>
+                  <a:off x="2060017" y="1684089"/>
+                  <a:ext cx="547909" cy="260060"/>
+                </a:xfrm>
+                <a:prstGeom prst="roundRect">
+                  <a:avLst/>
+                </a:prstGeom>
+              </p:spPr>
+              <p:style>
+                <a:lnRef idx="2">
+                  <a:schemeClr val="accent4">
+                    <a:shade val="50000"/>
+                  </a:schemeClr>
+                </a:lnRef>
+                <a:fillRef idx="1">
+                  <a:schemeClr val="accent4"/>
+                </a:fillRef>
+                <a:effectRef idx="0">
+                  <a:schemeClr val="accent4"/>
+                </a:effectRef>
+                <a:fontRef idx="minor">
+                  <a:schemeClr val="lt1"/>
+                </a:fontRef>
+              </p:style>
+              <p:txBody>
+                <a:bodyPr rtlCol="0" anchor="ctr"/>
+                <a:lstStyle/>
+                <a:p>
+                  <a:pPr algn="ctr"/>
+                  <a:r>
+                    <a:rPr lang="de-DE" sz="1200" dirty="0">
+                      <a:solidFill>
+                        <a:schemeClr val="tx1"/>
+                      </a:solidFill>
+                    </a:rPr>
+                    <a:t>TF2</a:t>
+                  </a:r>
+                  <a:endParaRPr lang="de-DE" dirty="0">
+                    <a:solidFill>
+                      <a:schemeClr val="tx1"/>
+                    </a:solidFill>
+                  </a:endParaRPr>
+                </a:p>
+              </p:txBody>
+            </p:sp>
+            <p:sp>
+              <p:nvSpPr>
+                <p:cNvPr id="62" name="Rechteck: abgerundete Ecken 61">
+                  <a:extLst>
+                    <a:ext uri="{FF2B5EF4-FFF2-40B4-BE49-F238E27FC236}">
+                      <a16:creationId xmlns:a16="http://schemas.microsoft.com/office/drawing/2014/main" id="{7B262FF9-7BBD-41B5-8D71-3560B4CFD0E5}"/>
+                    </a:ext>
+                  </a:extLst>
+                </p:cNvPr>
+                <p:cNvSpPr/>
+                <p:nvPr/>
+              </p:nvSpPr>
+              <p:spPr>
+                <a:xfrm>
+                  <a:off x="1440281" y="2033280"/>
+                  <a:ext cx="547909" cy="260060"/>
+                </a:xfrm>
+                <a:prstGeom prst="roundRect">
+                  <a:avLst/>
+                </a:prstGeom>
+              </p:spPr>
+              <p:style>
+                <a:lnRef idx="2">
+                  <a:schemeClr val="accent4">
+                    <a:shade val="50000"/>
+                  </a:schemeClr>
+                </a:lnRef>
+                <a:fillRef idx="1">
+                  <a:schemeClr val="accent4"/>
+                </a:fillRef>
+                <a:effectRef idx="0">
+                  <a:schemeClr val="accent4"/>
+                </a:effectRef>
+                <a:fontRef idx="minor">
+                  <a:schemeClr val="lt1"/>
+                </a:fontRef>
+              </p:style>
+              <p:txBody>
+                <a:bodyPr rtlCol="0" anchor="ctr"/>
+                <a:lstStyle/>
+                <a:p>
+                  <a:pPr algn="ctr"/>
+                  <a:r>
+                    <a:rPr lang="de-DE" sz="1200" dirty="0">
+                      <a:solidFill>
+                        <a:schemeClr val="tx1"/>
+                      </a:solidFill>
+                    </a:rPr>
+                    <a:t>…</a:t>
+                  </a:r>
+                  <a:endParaRPr lang="de-DE" dirty="0">
+                    <a:solidFill>
+                      <a:schemeClr val="tx1"/>
+                    </a:solidFill>
+                  </a:endParaRPr>
+                </a:p>
+              </p:txBody>
+            </p:sp>
+            <p:sp>
+              <p:nvSpPr>
+                <p:cNvPr id="63" name="Rechteck: abgerundete Ecken 62">
+                  <a:extLst>
+                    <a:ext uri="{FF2B5EF4-FFF2-40B4-BE49-F238E27FC236}">
+                      <a16:creationId xmlns:a16="http://schemas.microsoft.com/office/drawing/2014/main" id="{C04A670C-D3B3-4595-8BC3-C6E2B51F80BD}"/>
+                    </a:ext>
+                  </a:extLst>
+                </p:cNvPr>
+                <p:cNvSpPr/>
+                <p:nvPr/>
+              </p:nvSpPr>
+              <p:spPr>
+                <a:xfrm>
+                  <a:off x="2060017" y="2036426"/>
+                  <a:ext cx="547909" cy="260060"/>
+                </a:xfrm>
+                <a:prstGeom prst="roundRect">
+                  <a:avLst/>
+                </a:prstGeom>
+              </p:spPr>
+              <p:style>
+                <a:lnRef idx="2">
+                  <a:schemeClr val="accent4">
+                    <a:shade val="50000"/>
+                  </a:schemeClr>
+                </a:lnRef>
+                <a:fillRef idx="1">
+                  <a:schemeClr val="accent4"/>
+                </a:fillRef>
+                <a:effectRef idx="0">
+                  <a:schemeClr val="accent4"/>
+                </a:effectRef>
+                <a:fontRef idx="minor">
+                  <a:schemeClr val="lt1"/>
+                </a:fontRef>
+              </p:style>
+              <p:txBody>
+                <a:bodyPr rtlCol="0" anchor="ctr"/>
+                <a:lstStyle/>
+                <a:p>
+                  <a:pPr algn="ctr"/>
+                  <a:r>
+                    <a:rPr lang="de-DE" sz="1200" dirty="0">
+                      <a:solidFill>
+                        <a:schemeClr val="tx1"/>
+                      </a:solidFill>
+                    </a:rPr>
+                    <a:t>TF42</a:t>
+                  </a:r>
+                  <a:endParaRPr lang="de-DE" dirty="0">
+                    <a:solidFill>
+                      <a:schemeClr val="tx1"/>
+                    </a:solidFill>
+                  </a:endParaRPr>
+                </a:p>
+              </p:txBody>
+            </p:sp>
+          </p:grpSp>
+        </p:grpSp>
+        <p:grpSp>
+          <p:nvGrpSpPr>
+            <p:cNvPr id="69" name="Gruppieren 68">
+              <a:extLst>
+                <a:ext uri="{FF2B5EF4-FFF2-40B4-BE49-F238E27FC236}">
+                  <a16:creationId xmlns:a16="http://schemas.microsoft.com/office/drawing/2014/main" id="{4D6550F9-9C9B-472D-9805-B6FA95AC66BE}"/>
+                </a:ext>
+              </a:extLst>
+            </p:cNvPr>
+            <p:cNvGrpSpPr/>
+            <p:nvPr/>
+          </p:nvGrpSpPr>
+          <p:grpSpPr>
+            <a:xfrm>
+              <a:off x="8805756" y="843093"/>
+              <a:ext cx="2080470" cy="4030908"/>
+              <a:chOff x="1224793" y="956345"/>
+              <a:chExt cx="1677798" cy="3565321"/>
+            </a:xfrm>
+          </p:grpSpPr>
+          <p:sp>
+            <p:nvSpPr>
+              <p:cNvPr id="70" name="Rechteck: abgerundete Ecken 69">
+                <a:extLst>
+                  <a:ext uri="{FF2B5EF4-FFF2-40B4-BE49-F238E27FC236}">
+                    <a16:creationId xmlns:a16="http://schemas.microsoft.com/office/drawing/2014/main" id="{AD721A68-FC74-40C5-BFD4-888478906D11}"/>
+                  </a:ext>
+                </a:extLst>
+              </p:cNvPr>
+              <p:cNvSpPr/>
+              <p:nvPr/>
+            </p:nvSpPr>
+            <p:spPr>
+              <a:xfrm>
+                <a:off x="1224793" y="956345"/>
+                <a:ext cx="1677798" cy="3565321"/>
+              </a:xfrm>
+              <a:prstGeom prst="roundRect">
+                <a:avLst/>
+              </a:prstGeom>
+            </p:spPr>
+            <p:style>
+              <a:lnRef idx="2">
+                <a:schemeClr val="accent1">
+                  <a:shade val="50000"/>
+                </a:schemeClr>
+              </a:lnRef>
+              <a:fillRef idx="1">
+                <a:schemeClr val="accent1"/>
+              </a:fillRef>
+              <a:effectRef idx="0">
+                <a:schemeClr val="accent1"/>
+              </a:effectRef>
+              <a:fontRef idx="minor">
+                <a:schemeClr val="lt1"/>
+              </a:fontRef>
+            </p:style>
+            <p:txBody>
+              <a:bodyPr rtlCol="0" anchor="t"/>
+              <a:lstStyle/>
+              <a:p>
+                <a:pPr algn="ctr"/>
+                <a:r>
+                  <a:rPr lang="de-DE" dirty="0"/>
+                  <a:t>Patient 29 – ROI 1</a:t>
+                </a:r>
+              </a:p>
+            </p:txBody>
+          </p:sp>
+          <p:sp>
+            <p:nvSpPr>
+              <p:cNvPr id="71" name="Rechteck: abgerundete Ecken 70">
+                <a:extLst>
+                  <a:ext uri="{FF2B5EF4-FFF2-40B4-BE49-F238E27FC236}">
+                    <a16:creationId xmlns:a16="http://schemas.microsoft.com/office/drawing/2014/main" id="{1F69CC88-6EDE-4B63-85F8-5F4749E2DFC8}"/>
+                  </a:ext>
+                </a:extLst>
+              </p:cNvPr>
+              <p:cNvSpPr/>
+              <p:nvPr/>
+            </p:nvSpPr>
+            <p:spPr>
+              <a:xfrm>
+                <a:off x="1368452" y="2543961"/>
+                <a:ext cx="1390477" cy="478173"/>
+              </a:xfrm>
+              <a:prstGeom prst="roundRect">
+                <a:avLst/>
+              </a:prstGeom>
+            </p:spPr>
+            <p:style>
+              <a:lnRef idx="2">
+                <a:schemeClr val="accent5">
+                  <a:shade val="50000"/>
+                </a:schemeClr>
+              </a:lnRef>
+              <a:fillRef idx="1">
+                <a:schemeClr val="accent5"/>
+              </a:fillRef>
+              <a:effectRef idx="0">
+                <a:schemeClr val="accent5"/>
+              </a:effectRef>
+              <a:fontRef idx="minor">
+                <a:schemeClr val="lt1"/>
+              </a:fontRef>
+            </p:style>
+            <p:txBody>
+              <a:bodyPr rtlCol="0" anchor="ctr"/>
+              <a:lstStyle/>
+              <a:p>
+                <a:pPr lvl="0" algn="ctr"/>
+                <a:r>
+                  <a:rPr lang="de-DE" sz="1200" dirty="0">
+                    <a:solidFill>
+                      <a:prstClr val="white"/>
+                    </a:solidFill>
+                  </a:rPr>
+                  <a:t>… 11 weitere Dosen …</a:t>
+                </a:r>
+              </a:p>
+            </p:txBody>
+          </p:sp>
+          <p:grpSp>
+            <p:nvGrpSpPr>
+              <p:cNvPr id="72" name="Gruppieren 71">
+                <a:extLst>
+                  <a:ext uri="{FF2B5EF4-FFF2-40B4-BE49-F238E27FC236}">
+                    <a16:creationId xmlns:a16="http://schemas.microsoft.com/office/drawing/2014/main" id="{A30EE417-5E53-46AE-8DE2-2CABA6AAE9DA}"/>
+                  </a:ext>
+                </a:extLst>
+              </p:cNvPr>
+              <p:cNvGrpSpPr/>
+              <p:nvPr/>
+            </p:nvGrpSpPr>
+            <p:grpSpPr>
+              <a:xfrm>
+                <a:off x="1368453" y="1421932"/>
+                <a:ext cx="1390477" cy="1044431"/>
+                <a:chOff x="1368453" y="1421932"/>
+                <a:chExt cx="1390477" cy="1044431"/>
+              </a:xfrm>
+            </p:grpSpPr>
+            <p:sp>
+              <p:nvSpPr>
+                <p:cNvPr id="79" name="Rechteck: abgerundete Ecken 78">
+                  <a:extLst>
+                    <a:ext uri="{FF2B5EF4-FFF2-40B4-BE49-F238E27FC236}">
+                      <a16:creationId xmlns:a16="http://schemas.microsoft.com/office/drawing/2014/main" id="{C9380762-65CE-4C3A-BAA2-E93ACAE10005}"/>
+                    </a:ext>
+                  </a:extLst>
+                </p:cNvPr>
+                <p:cNvSpPr/>
+                <p:nvPr/>
+              </p:nvSpPr>
+              <p:spPr>
+                <a:xfrm>
+                  <a:off x="1368453" y="1421932"/>
+                  <a:ext cx="1390477" cy="1044431"/>
+                </a:xfrm>
+                <a:prstGeom prst="roundRect">
+                  <a:avLst/>
+                </a:prstGeom>
+              </p:spPr>
+              <p:style>
+                <a:lnRef idx="2">
+                  <a:schemeClr val="accent5">
+                    <a:shade val="50000"/>
+                  </a:schemeClr>
+                </a:lnRef>
+                <a:fillRef idx="1">
+                  <a:schemeClr val="accent5"/>
+                </a:fillRef>
+                <a:effectRef idx="0">
+                  <a:schemeClr val="accent5"/>
+                </a:effectRef>
+                <a:fontRef idx="minor">
+                  <a:schemeClr val="lt1"/>
+                </a:fontRef>
+              </p:style>
+              <p:txBody>
+                <a:bodyPr rtlCol="0" anchor="t"/>
+                <a:lstStyle/>
+                <a:p>
+                  <a:pPr algn="ctr"/>
+                  <a:r>
+                    <a:rPr lang="de-DE" sz="1000" dirty="0"/>
+                    <a:t>Dose 3.5</a:t>
+                  </a:r>
+                </a:p>
+              </p:txBody>
+            </p:sp>
+            <p:sp>
+              <p:nvSpPr>
+                <p:cNvPr id="80" name="Rechteck: abgerundete Ecken 79">
+                  <a:extLst>
+                    <a:ext uri="{FF2B5EF4-FFF2-40B4-BE49-F238E27FC236}">
+                      <a16:creationId xmlns:a16="http://schemas.microsoft.com/office/drawing/2014/main" id="{01186BC2-FA90-47A1-988B-2708E79E9B08}"/>
+                    </a:ext>
+                  </a:extLst>
+                </p:cNvPr>
+                <p:cNvSpPr/>
+                <p:nvPr/>
+              </p:nvSpPr>
+              <p:spPr>
+                <a:xfrm>
+                  <a:off x="1440281" y="1684089"/>
+                  <a:ext cx="547909" cy="260060"/>
+                </a:xfrm>
+                <a:prstGeom prst="roundRect">
+                  <a:avLst/>
+                </a:prstGeom>
+              </p:spPr>
+              <p:style>
+                <a:lnRef idx="2">
+                  <a:schemeClr val="accent4">
+                    <a:shade val="50000"/>
+                  </a:schemeClr>
+                </a:lnRef>
+                <a:fillRef idx="1">
+                  <a:schemeClr val="accent4"/>
+                </a:fillRef>
+                <a:effectRef idx="0">
+                  <a:schemeClr val="accent4"/>
+                </a:effectRef>
+                <a:fontRef idx="minor">
+                  <a:schemeClr val="lt1"/>
+                </a:fontRef>
+              </p:style>
+              <p:txBody>
+                <a:bodyPr rtlCol="0" anchor="ctr"/>
+                <a:lstStyle/>
+                <a:p>
+                  <a:pPr algn="ctr"/>
+                  <a:r>
+                    <a:rPr lang="de-DE" sz="1200" dirty="0">
+                      <a:solidFill>
+                        <a:schemeClr val="tx1"/>
+                      </a:solidFill>
+                    </a:rPr>
+                    <a:t>TF1</a:t>
+                  </a:r>
+                  <a:endParaRPr lang="de-DE" dirty="0">
+                    <a:solidFill>
+                      <a:schemeClr val="tx1"/>
+                    </a:solidFill>
+                  </a:endParaRPr>
+                </a:p>
+              </p:txBody>
+            </p:sp>
+            <p:sp>
+              <p:nvSpPr>
+                <p:cNvPr id="81" name="Rechteck: abgerundete Ecken 80">
+                  <a:extLst>
+                    <a:ext uri="{FF2B5EF4-FFF2-40B4-BE49-F238E27FC236}">
+                      <a16:creationId xmlns:a16="http://schemas.microsoft.com/office/drawing/2014/main" id="{01F28520-CF4C-4C23-A538-0D5093B11FFB}"/>
+                    </a:ext>
+                  </a:extLst>
+                </p:cNvPr>
+                <p:cNvSpPr/>
+                <p:nvPr/>
+              </p:nvSpPr>
+              <p:spPr>
+                <a:xfrm>
+                  <a:off x="2060017" y="1684089"/>
+                  <a:ext cx="547909" cy="260060"/>
+                </a:xfrm>
+                <a:prstGeom prst="roundRect">
+                  <a:avLst/>
+                </a:prstGeom>
+              </p:spPr>
+              <p:style>
+                <a:lnRef idx="2">
+                  <a:schemeClr val="accent4">
+                    <a:shade val="50000"/>
+                  </a:schemeClr>
+                </a:lnRef>
+                <a:fillRef idx="1">
+                  <a:schemeClr val="accent4"/>
+                </a:fillRef>
+                <a:effectRef idx="0">
+                  <a:schemeClr val="accent4"/>
+                </a:effectRef>
+                <a:fontRef idx="minor">
+                  <a:schemeClr val="lt1"/>
+                </a:fontRef>
+              </p:style>
+              <p:txBody>
+                <a:bodyPr rtlCol="0" anchor="ctr"/>
+                <a:lstStyle/>
+                <a:p>
+                  <a:pPr algn="ctr"/>
+                  <a:r>
+                    <a:rPr lang="de-DE" sz="1200" dirty="0">
+                      <a:solidFill>
+                        <a:schemeClr val="tx1"/>
+                      </a:solidFill>
+                    </a:rPr>
+                    <a:t>TF2</a:t>
+                  </a:r>
+                  <a:endParaRPr lang="de-DE" dirty="0">
+                    <a:solidFill>
+                      <a:schemeClr val="tx1"/>
+                    </a:solidFill>
+                  </a:endParaRPr>
+                </a:p>
+              </p:txBody>
+            </p:sp>
+            <p:sp>
+              <p:nvSpPr>
+                <p:cNvPr id="82" name="Rechteck: abgerundete Ecken 81">
+                  <a:extLst>
+                    <a:ext uri="{FF2B5EF4-FFF2-40B4-BE49-F238E27FC236}">
+                      <a16:creationId xmlns:a16="http://schemas.microsoft.com/office/drawing/2014/main" id="{0F55CD09-6B7F-48B6-B4B5-482D3FD2E805}"/>
+                    </a:ext>
+                  </a:extLst>
+                </p:cNvPr>
+                <p:cNvSpPr/>
+                <p:nvPr/>
+              </p:nvSpPr>
+              <p:spPr>
+                <a:xfrm>
+                  <a:off x="1440281" y="2033280"/>
+                  <a:ext cx="547909" cy="260060"/>
+                </a:xfrm>
+                <a:prstGeom prst="roundRect">
+                  <a:avLst/>
+                </a:prstGeom>
+              </p:spPr>
+              <p:style>
+                <a:lnRef idx="2">
+                  <a:schemeClr val="accent4">
+                    <a:shade val="50000"/>
+                  </a:schemeClr>
+                </a:lnRef>
+                <a:fillRef idx="1">
+                  <a:schemeClr val="accent4"/>
+                </a:fillRef>
+                <a:effectRef idx="0">
+                  <a:schemeClr val="accent4"/>
+                </a:effectRef>
+                <a:fontRef idx="minor">
+                  <a:schemeClr val="lt1"/>
+                </a:fontRef>
+              </p:style>
+              <p:txBody>
+                <a:bodyPr rtlCol="0" anchor="ctr"/>
+                <a:lstStyle/>
+                <a:p>
+                  <a:pPr algn="ctr"/>
+                  <a:r>
+                    <a:rPr lang="de-DE" sz="1200" dirty="0">
+                      <a:solidFill>
+                        <a:schemeClr val="tx1"/>
+                      </a:solidFill>
+                    </a:rPr>
+                    <a:t>…</a:t>
+                  </a:r>
+                  <a:endParaRPr lang="de-DE" dirty="0">
+                    <a:solidFill>
+                      <a:schemeClr val="tx1"/>
+                    </a:solidFill>
+                  </a:endParaRPr>
+                </a:p>
+              </p:txBody>
+            </p:sp>
+            <p:sp>
+              <p:nvSpPr>
+                <p:cNvPr id="83" name="Rechteck: abgerundete Ecken 82">
+                  <a:extLst>
+                    <a:ext uri="{FF2B5EF4-FFF2-40B4-BE49-F238E27FC236}">
+                      <a16:creationId xmlns:a16="http://schemas.microsoft.com/office/drawing/2014/main" id="{D7C3A3FF-BB3A-46BF-8EB7-0EC068AB5367}"/>
+                    </a:ext>
+                  </a:extLst>
+                </p:cNvPr>
+                <p:cNvSpPr/>
+                <p:nvPr/>
+              </p:nvSpPr>
+              <p:spPr>
+                <a:xfrm>
+                  <a:off x="2060017" y="2036426"/>
+                  <a:ext cx="547909" cy="260060"/>
+                </a:xfrm>
+                <a:prstGeom prst="roundRect">
+                  <a:avLst/>
+                </a:prstGeom>
+              </p:spPr>
+              <p:style>
+                <a:lnRef idx="2">
+                  <a:schemeClr val="accent4">
+                    <a:shade val="50000"/>
+                  </a:schemeClr>
+                </a:lnRef>
+                <a:fillRef idx="1">
+                  <a:schemeClr val="accent4"/>
+                </a:fillRef>
+                <a:effectRef idx="0">
+                  <a:schemeClr val="accent4"/>
+                </a:effectRef>
+                <a:fontRef idx="minor">
+                  <a:schemeClr val="lt1"/>
+                </a:fontRef>
+              </p:style>
+              <p:txBody>
+                <a:bodyPr rtlCol="0" anchor="ctr"/>
+                <a:lstStyle/>
+                <a:p>
+                  <a:pPr algn="ctr"/>
+                  <a:r>
+                    <a:rPr lang="de-DE" sz="1200" dirty="0">
+                      <a:solidFill>
+                        <a:schemeClr val="tx1"/>
+                      </a:solidFill>
+                    </a:rPr>
+                    <a:t>TF42</a:t>
+                  </a:r>
+                  <a:endParaRPr lang="de-DE" dirty="0">
+                    <a:solidFill>
+                      <a:schemeClr val="tx1"/>
+                    </a:solidFill>
+                  </a:endParaRPr>
+                </a:p>
+              </p:txBody>
+            </p:sp>
+          </p:grpSp>
+          <p:grpSp>
+            <p:nvGrpSpPr>
+              <p:cNvPr id="73" name="Gruppieren 72">
+                <a:extLst>
+                  <a:ext uri="{FF2B5EF4-FFF2-40B4-BE49-F238E27FC236}">
+                    <a16:creationId xmlns:a16="http://schemas.microsoft.com/office/drawing/2014/main" id="{90FB3A8A-D4F4-4C2C-B4EE-044BDFB7837E}"/>
+                  </a:ext>
+                </a:extLst>
+              </p:cNvPr>
+              <p:cNvGrpSpPr/>
+              <p:nvPr/>
+            </p:nvGrpSpPr>
+            <p:grpSpPr>
+              <a:xfrm>
+                <a:off x="1364778" y="3099732"/>
+                <a:ext cx="1390477" cy="1044431"/>
+                <a:chOff x="1368453" y="1421932"/>
+                <a:chExt cx="1390477" cy="1044431"/>
+              </a:xfrm>
+            </p:grpSpPr>
+            <p:sp>
+              <p:nvSpPr>
+                <p:cNvPr id="74" name="Rechteck: abgerundete Ecken 73">
+                  <a:extLst>
+                    <a:ext uri="{FF2B5EF4-FFF2-40B4-BE49-F238E27FC236}">
+                      <a16:creationId xmlns:a16="http://schemas.microsoft.com/office/drawing/2014/main" id="{469451BE-A9BD-43CB-8D60-B5F1DDD2236A}"/>
+                    </a:ext>
+                  </a:extLst>
+                </p:cNvPr>
+                <p:cNvSpPr/>
+                <p:nvPr/>
+              </p:nvSpPr>
+              <p:spPr>
+                <a:xfrm>
+                  <a:off x="1368453" y="1421932"/>
+                  <a:ext cx="1390477" cy="1044431"/>
+                </a:xfrm>
+                <a:prstGeom prst="roundRect">
+                  <a:avLst/>
+                </a:prstGeom>
+              </p:spPr>
+              <p:style>
+                <a:lnRef idx="2">
+                  <a:schemeClr val="accent5">
+                    <a:shade val="50000"/>
+                  </a:schemeClr>
+                </a:lnRef>
+                <a:fillRef idx="1">
+                  <a:schemeClr val="accent5"/>
+                </a:fillRef>
+                <a:effectRef idx="0">
+                  <a:schemeClr val="accent5"/>
+                </a:effectRef>
+                <a:fontRef idx="minor">
+                  <a:schemeClr val="lt1"/>
+                </a:fontRef>
+              </p:style>
+              <p:txBody>
+                <a:bodyPr rtlCol="0" anchor="t"/>
+                <a:lstStyle/>
+                <a:p>
+                  <a:pPr algn="ctr"/>
+                  <a:r>
+                    <a:rPr lang="de-DE" sz="1000" dirty="0"/>
+                    <a:t>Dose 0.5</a:t>
+                  </a:r>
+                </a:p>
+              </p:txBody>
+            </p:sp>
+            <p:sp>
+              <p:nvSpPr>
+                <p:cNvPr id="75" name="Rechteck: abgerundete Ecken 74">
+                  <a:extLst>
+                    <a:ext uri="{FF2B5EF4-FFF2-40B4-BE49-F238E27FC236}">
+                      <a16:creationId xmlns:a16="http://schemas.microsoft.com/office/drawing/2014/main" id="{1048226B-F08A-4324-AA63-3FB0236619B6}"/>
+                    </a:ext>
+                  </a:extLst>
+                </p:cNvPr>
+                <p:cNvSpPr/>
+                <p:nvPr/>
+              </p:nvSpPr>
+              <p:spPr>
+                <a:xfrm>
+                  <a:off x="1440281" y="1684089"/>
+                  <a:ext cx="547909" cy="260060"/>
+                </a:xfrm>
+                <a:prstGeom prst="roundRect">
+                  <a:avLst/>
+                </a:prstGeom>
+              </p:spPr>
+              <p:style>
+                <a:lnRef idx="2">
+                  <a:schemeClr val="accent4">
+                    <a:shade val="50000"/>
+                  </a:schemeClr>
+                </a:lnRef>
+                <a:fillRef idx="1">
+                  <a:schemeClr val="accent4"/>
+                </a:fillRef>
+                <a:effectRef idx="0">
+                  <a:schemeClr val="accent4"/>
+                </a:effectRef>
+                <a:fontRef idx="minor">
+                  <a:schemeClr val="lt1"/>
+                </a:fontRef>
+              </p:style>
+              <p:txBody>
+                <a:bodyPr rtlCol="0" anchor="ctr"/>
+                <a:lstStyle/>
+                <a:p>
+                  <a:pPr algn="ctr"/>
+                  <a:r>
+                    <a:rPr lang="de-DE" sz="1200" dirty="0">
+                      <a:solidFill>
+                        <a:schemeClr val="tx1"/>
+                      </a:solidFill>
+                    </a:rPr>
+                    <a:t>TF1</a:t>
+                  </a:r>
+                  <a:endParaRPr lang="de-DE" dirty="0">
+                    <a:solidFill>
+                      <a:schemeClr val="tx1"/>
+                    </a:solidFill>
+                  </a:endParaRPr>
+                </a:p>
+              </p:txBody>
+            </p:sp>
+            <p:sp>
+              <p:nvSpPr>
+                <p:cNvPr id="76" name="Rechteck: abgerundete Ecken 75">
+                  <a:extLst>
+                    <a:ext uri="{FF2B5EF4-FFF2-40B4-BE49-F238E27FC236}">
+                      <a16:creationId xmlns:a16="http://schemas.microsoft.com/office/drawing/2014/main" id="{2C565888-C4FA-45DC-9035-142D8DE70B9F}"/>
+                    </a:ext>
+                  </a:extLst>
+                </p:cNvPr>
+                <p:cNvSpPr/>
+                <p:nvPr/>
+              </p:nvSpPr>
+              <p:spPr>
+                <a:xfrm>
+                  <a:off x="2060017" y="1684089"/>
+                  <a:ext cx="547909" cy="260060"/>
+                </a:xfrm>
+                <a:prstGeom prst="roundRect">
+                  <a:avLst/>
+                </a:prstGeom>
+              </p:spPr>
+              <p:style>
+                <a:lnRef idx="2">
+                  <a:schemeClr val="accent4">
+                    <a:shade val="50000"/>
+                  </a:schemeClr>
+                </a:lnRef>
+                <a:fillRef idx="1">
+                  <a:schemeClr val="accent4"/>
+                </a:fillRef>
+                <a:effectRef idx="0">
+                  <a:schemeClr val="accent4"/>
+                </a:effectRef>
+                <a:fontRef idx="minor">
+                  <a:schemeClr val="lt1"/>
+                </a:fontRef>
+              </p:style>
+              <p:txBody>
+                <a:bodyPr rtlCol="0" anchor="ctr"/>
+                <a:lstStyle/>
+                <a:p>
+                  <a:pPr algn="ctr"/>
+                  <a:r>
+                    <a:rPr lang="de-DE" sz="1200" dirty="0">
+                      <a:solidFill>
+                        <a:schemeClr val="tx1"/>
+                      </a:solidFill>
+                    </a:rPr>
+                    <a:t>TF2</a:t>
+                  </a:r>
+                  <a:endParaRPr lang="de-DE" dirty="0">
+                    <a:solidFill>
+                      <a:schemeClr val="tx1"/>
+                    </a:solidFill>
+                  </a:endParaRPr>
+                </a:p>
+              </p:txBody>
+            </p:sp>
+            <p:sp>
+              <p:nvSpPr>
+                <p:cNvPr id="77" name="Rechteck: abgerundete Ecken 76">
+                  <a:extLst>
+                    <a:ext uri="{FF2B5EF4-FFF2-40B4-BE49-F238E27FC236}">
+                      <a16:creationId xmlns:a16="http://schemas.microsoft.com/office/drawing/2014/main" id="{8473CDA9-0F94-4F92-B8B9-F4F77734EAC1}"/>
+                    </a:ext>
+                  </a:extLst>
+                </p:cNvPr>
+                <p:cNvSpPr/>
+                <p:nvPr/>
+              </p:nvSpPr>
+              <p:spPr>
+                <a:xfrm>
+                  <a:off x="1440281" y="2033280"/>
+                  <a:ext cx="547909" cy="260060"/>
+                </a:xfrm>
+                <a:prstGeom prst="roundRect">
+                  <a:avLst/>
+                </a:prstGeom>
+              </p:spPr>
+              <p:style>
+                <a:lnRef idx="2">
+                  <a:schemeClr val="accent4">
+                    <a:shade val="50000"/>
+                  </a:schemeClr>
+                </a:lnRef>
+                <a:fillRef idx="1">
+                  <a:schemeClr val="accent4"/>
+                </a:fillRef>
+                <a:effectRef idx="0">
+                  <a:schemeClr val="accent4"/>
+                </a:effectRef>
+                <a:fontRef idx="minor">
+                  <a:schemeClr val="lt1"/>
+                </a:fontRef>
+              </p:style>
+              <p:txBody>
+                <a:bodyPr rtlCol="0" anchor="ctr"/>
+                <a:lstStyle/>
+                <a:p>
+                  <a:pPr algn="ctr"/>
+                  <a:r>
+                    <a:rPr lang="de-DE" sz="1200" dirty="0">
+                      <a:solidFill>
+                        <a:schemeClr val="tx1"/>
+                      </a:solidFill>
+                    </a:rPr>
+                    <a:t>…</a:t>
+                  </a:r>
+                  <a:endParaRPr lang="de-DE" dirty="0">
+                    <a:solidFill>
+                      <a:schemeClr val="tx1"/>
+                    </a:solidFill>
+                  </a:endParaRPr>
+                </a:p>
+              </p:txBody>
+            </p:sp>
+            <p:sp>
+              <p:nvSpPr>
+                <p:cNvPr id="78" name="Rechteck: abgerundete Ecken 77">
+                  <a:extLst>
+                    <a:ext uri="{FF2B5EF4-FFF2-40B4-BE49-F238E27FC236}">
+                      <a16:creationId xmlns:a16="http://schemas.microsoft.com/office/drawing/2014/main" id="{D455D7C4-9A64-455C-B702-9456273AE4A6}"/>
+                    </a:ext>
+                  </a:extLst>
+                </p:cNvPr>
+                <p:cNvSpPr/>
+                <p:nvPr/>
+              </p:nvSpPr>
+              <p:spPr>
+                <a:xfrm>
+                  <a:off x="2060017" y="2036426"/>
+                  <a:ext cx="547909" cy="260060"/>
+                </a:xfrm>
+                <a:prstGeom prst="roundRect">
+                  <a:avLst/>
+                </a:prstGeom>
+              </p:spPr>
+              <p:style>
+                <a:lnRef idx="2">
+                  <a:schemeClr val="accent4">
+                    <a:shade val="50000"/>
+                  </a:schemeClr>
+                </a:lnRef>
+                <a:fillRef idx="1">
+                  <a:schemeClr val="accent4"/>
+                </a:fillRef>
+                <a:effectRef idx="0">
+                  <a:schemeClr val="accent4"/>
+                </a:effectRef>
+                <a:fontRef idx="minor">
+                  <a:schemeClr val="lt1"/>
+                </a:fontRef>
+              </p:style>
+              <p:txBody>
+                <a:bodyPr rtlCol="0" anchor="ctr"/>
+                <a:lstStyle/>
+                <a:p>
+                  <a:pPr algn="ctr"/>
+                  <a:r>
+                    <a:rPr lang="de-DE" sz="1200" dirty="0">
+                      <a:solidFill>
+                        <a:schemeClr val="tx1"/>
+                      </a:solidFill>
+                    </a:rPr>
+                    <a:t>TF42</a:t>
+                  </a:r>
+                  <a:endParaRPr lang="de-DE" dirty="0">
+                    <a:solidFill>
+                      <a:schemeClr val="tx1"/>
+                    </a:solidFill>
+                  </a:endParaRPr>
+                </a:p>
+              </p:txBody>
+            </p:sp>
+          </p:grpSp>
+        </p:grpSp>
+      </p:grpSp>
+      <p:sp>
+        <p:nvSpPr>
+          <p:cNvPr id="84" name="Textfeld 83">
+            <a:extLst>
+              <a:ext uri="{FF2B5EF4-FFF2-40B4-BE49-F238E27FC236}">
+                <a16:creationId xmlns:a16="http://schemas.microsoft.com/office/drawing/2014/main" id="{8A49F223-8579-43F3-B7D0-900E4BD2BF33}"/>
+              </a:ext>
+            </a:extLst>
+          </p:cNvPr>
+          <p:cNvSpPr txBox="1"/>
+          <p:nvPr/>
+        </p:nvSpPr>
+        <p:spPr>
+          <a:xfrm>
+            <a:off x="146794" y="-5107"/>
+            <a:ext cx="12192000" cy="523220"/>
+          </a:xfrm>
+          <a:prstGeom prst="rect">
+            <a:avLst/>
+          </a:prstGeom>
+          <a:noFill/>
+        </p:spPr>
+        <p:txBody>
+          <a:bodyPr wrap="square" rtlCol="0">
+            <a:spAutoFit/>
+          </a:bodyPr>
+          <a:lstStyle/>
+          <a:p>
+            <a:pPr algn="ctr"/>
+            <a:r>
+              <a:rPr lang="de-DE" sz="2800" dirty="0"/>
+              <a:t>Ausgangslage</a:t>
+            </a:r>
+          </a:p>
+        </p:txBody>
+      </p:sp>
+      <p:cxnSp>
+        <p:nvCxnSpPr>
+          <p:cNvPr id="10" name="Gerade Verbindung mit Pfeil 9">
+            <a:extLst>
+              <a:ext uri="{FF2B5EF4-FFF2-40B4-BE49-F238E27FC236}">
+                <a16:creationId xmlns:a16="http://schemas.microsoft.com/office/drawing/2014/main" id="{7F580476-7C7F-4046-8FD9-40ADACA9041E}"/>
+              </a:ext>
+            </a:extLst>
+          </p:cNvPr>
+          <p:cNvCxnSpPr/>
+          <p:nvPr/>
+        </p:nvCxnSpPr>
+        <p:spPr>
+          <a:xfrm>
+            <a:off x="1770077" y="1350812"/>
+            <a:ext cx="0" cy="4127383"/>
+          </a:xfrm>
+          <a:prstGeom prst="straightConnector1">
+            <a:avLst/>
+          </a:prstGeom>
+          <a:ln>
+            <a:tailEnd type="triangle"/>
+          </a:ln>
+        </p:spPr>
+        <p:style>
+          <a:lnRef idx="2">
+            <a:schemeClr val="accent6"/>
+          </a:lnRef>
+          <a:fillRef idx="0">
+            <a:schemeClr val="accent6"/>
+          </a:fillRef>
+          <a:effectRef idx="1">
+            <a:schemeClr val="accent6"/>
+          </a:effectRef>
+          <a:fontRef idx="minor">
+            <a:schemeClr val="tx1"/>
+          </a:fontRef>
+        </p:style>
+      </p:cxnSp>
+      <p:sp>
+        <p:nvSpPr>
+          <p:cNvPr id="11" name="Textfeld 10">
+            <a:extLst>
+              <a:ext uri="{FF2B5EF4-FFF2-40B4-BE49-F238E27FC236}">
+                <a16:creationId xmlns:a16="http://schemas.microsoft.com/office/drawing/2014/main" id="{87F6ABF8-6DA5-4D42-A016-5EA979F98DAB}"/>
+              </a:ext>
+            </a:extLst>
+          </p:cNvPr>
+          <p:cNvSpPr txBox="1"/>
+          <p:nvPr/>
+        </p:nvSpPr>
+        <p:spPr>
+          <a:xfrm>
+            <a:off x="85102" y="2539195"/>
+            <a:ext cx="1526350" cy="1569660"/>
+          </a:xfrm>
+          <a:prstGeom prst="rect">
+            <a:avLst/>
+          </a:prstGeom>
+          <a:noFill/>
+        </p:spPr>
+        <p:txBody>
+          <a:bodyPr wrap="square" rtlCol="0">
+            <a:spAutoFit/>
+          </a:bodyPr>
+          <a:lstStyle/>
+          <a:p>
+            <a:r>
+              <a:rPr lang="de-DE" sz="1600" dirty="0">
+                <a:solidFill>
+                  <a:schemeClr val="accent6"/>
+                </a:solidFill>
+              </a:rPr>
+              <a:t>Verbunden, da alle </a:t>
+            </a:r>
+          </a:p>
+          <a:p>
+            <a:r>
+              <a:rPr lang="de-DE" sz="1600" dirty="0">
+                <a:solidFill>
+                  <a:schemeClr val="accent6"/>
+                </a:solidFill>
+              </a:rPr>
+              <a:t>kleineren Dosen von 3MBq abhängen und gleicher Patient</a:t>
+            </a:r>
+          </a:p>
+        </p:txBody>
+      </p:sp>
+      <p:cxnSp>
+        <p:nvCxnSpPr>
+          <p:cNvPr id="131" name="Gerade Verbindung mit Pfeil 130">
+            <a:extLst>
+              <a:ext uri="{FF2B5EF4-FFF2-40B4-BE49-F238E27FC236}">
+                <a16:creationId xmlns:a16="http://schemas.microsoft.com/office/drawing/2014/main" id="{E08089CD-BBF9-4BD2-ADFB-B40E5892D4A7}"/>
+              </a:ext>
+            </a:extLst>
+          </p:cNvPr>
+          <p:cNvCxnSpPr>
+            <a:cxnSpLocks/>
+          </p:cNvCxnSpPr>
+          <p:nvPr/>
+        </p:nvCxnSpPr>
+        <p:spPr>
+          <a:xfrm>
+            <a:off x="1909712" y="907594"/>
+            <a:ext cx="9929057" cy="0"/>
+          </a:xfrm>
+          <a:prstGeom prst="straightConnector1">
+            <a:avLst/>
+          </a:prstGeom>
+          <a:ln>
+            <a:tailEnd type="triangle"/>
+          </a:ln>
+        </p:spPr>
+        <p:style>
+          <a:lnRef idx="2">
+            <a:schemeClr val="accent6"/>
+          </a:lnRef>
+          <a:fillRef idx="0">
+            <a:schemeClr val="accent6"/>
+          </a:fillRef>
+          <a:effectRef idx="1">
+            <a:schemeClr val="accent6"/>
+          </a:effectRef>
+          <a:fontRef idx="minor">
+            <a:schemeClr val="tx1"/>
+          </a:fontRef>
+        </p:style>
+      </p:cxnSp>
+      <p:sp>
+        <p:nvSpPr>
+          <p:cNvPr id="132" name="Textfeld 131">
+            <a:extLst>
+              <a:ext uri="{FF2B5EF4-FFF2-40B4-BE49-F238E27FC236}">
+                <a16:creationId xmlns:a16="http://schemas.microsoft.com/office/drawing/2014/main" id="{514CC544-36D7-46B8-9ECD-D87BA785E998}"/>
+              </a:ext>
+            </a:extLst>
+          </p:cNvPr>
+          <p:cNvSpPr txBox="1"/>
+          <p:nvPr/>
+        </p:nvSpPr>
+        <p:spPr>
+          <a:xfrm>
+            <a:off x="1869769" y="599670"/>
+            <a:ext cx="5647001" cy="338554"/>
+          </a:xfrm>
+          <a:prstGeom prst="rect">
+            <a:avLst/>
+          </a:prstGeom>
+          <a:noFill/>
+        </p:spPr>
+        <p:txBody>
+          <a:bodyPr wrap="square" rtlCol="0">
+            <a:spAutoFit/>
+          </a:bodyPr>
+          <a:lstStyle/>
+          <a:p>
+            <a:r>
+              <a:rPr lang="de-DE" sz="1600" dirty="0">
+                <a:solidFill>
+                  <a:schemeClr val="accent6"/>
+                </a:solidFill>
+              </a:rPr>
+              <a:t>Unverbunden, zufällig ausgewählte Patienten</a:t>
+            </a:r>
+          </a:p>
+        </p:txBody>
+      </p:sp>
+    </p:spTree>
+    <p:extLst>
+      <p:ext uri="{BB962C8B-B14F-4D97-AF65-F5344CB8AC3E}">
+        <p14:creationId xmlns:p14="http://schemas.microsoft.com/office/powerpoint/2010/main" val="2363987909"/>
+      </p:ext>
+    </p:extLst>
+  </p:cSld>
+  <p:clrMapOvr>
+    <a:masterClrMapping/>
+  </p:clrMapOvr>
+</p:sld>
+</file>
+
+<file path=ppt/slides/slide3.xml><?xml version="1.0" encoding="utf-8"?>
 <p:sld xmlns:a="http://schemas.openxmlformats.org/drawingml/2006/main" xmlns:r="http://schemas.openxmlformats.org/officeDocument/2006/relationships" xmlns:p="http://schemas.openxmlformats.org/presentationml/2006/main">
   <p:cSld>
     <p:spTree>
@@ -8280,14 +10725,22 @@
             <p:ph type="title"/>
           </p:nvPr>
         </p:nvSpPr>
-        <p:spPr/>
+        <p:spPr>
+          <a:xfrm>
+            <a:off x="2239861" y="116551"/>
+            <a:ext cx="7365533" cy="562957"/>
+          </a:xfrm>
+        </p:spPr>
         <p:txBody>
-          <a:bodyPr/>
+          <a:bodyPr>
+            <a:normAutofit/>
+          </a:bodyPr>
           <a:lstStyle/>
           <a:p>
+            <a:pPr algn="ctr"/>
             <a:r>
-              <a:rPr lang="de-DE" dirty="0"/>
-              <a:t>ROI-Gruppen nach Größe</a:t>
+              <a:rPr lang="de-DE" sz="1800" b="1" dirty="0"/>
+              <a:t>ROI-Gruppen nach Größe – für Studienarbeit Weinhold obsolet</a:t>
             </a:r>
           </a:p>
         </p:txBody>
@@ -8307,13 +10760,13 @@
           <p:nvPr>
             <p:extLst>
               <p:ext uri="{D42A27DB-BD31-4B8C-83A1-F6EECF244321}">
-                <p14:modId xmlns:p14="http://schemas.microsoft.com/office/powerpoint/2010/main" val="3018586552"/>
+                <p14:modId xmlns:p14="http://schemas.microsoft.com/office/powerpoint/2010/main" val="2972681841"/>
               </p:ext>
             </p:extLst>
           </p:nvPr>
         </p:nvGraphicFramePr>
         <p:xfrm>
-          <a:off x="390525" y="2501900"/>
+          <a:off x="434466" y="1690688"/>
           <a:ext cx="9651016" cy="2209800"/>
         </p:xfrm>
         <a:graphic>
@@ -8386,9 +10839,20 @@
                     <a:p>
                       <a:r>
                         <a:rPr lang="de-DE" dirty="0" err="1"/>
+                        <a:t>Patient.Maskennr</a:t>
+                      </a:r>
+                      <a:r>
+                        <a:rPr lang="de-DE" dirty="0"/>
+                        <a:t> (</a:t>
+                      </a:r>
+                      <a:r>
+                        <a:rPr lang="de-DE" dirty="0" err="1"/>
                         <a:t>Patient.ROIs</a:t>
                       </a:r>
-                      <a:endParaRPr lang="de-DE" dirty="0"/>
+                      <a:r>
+                        <a:rPr lang="de-DE" dirty="0"/>
+                        <a:t>)</a:t>
+                      </a:r>
                     </a:p>
                   </a:txBody>
                   <a:tcPr/>
@@ -9623,6 +12087,92 @@
           </a:p>
         </p:txBody>
       </p:sp>
+      <p:sp>
+        <p:nvSpPr>
+          <p:cNvPr id="3" name="Textfeld 2">
+            <a:extLst>
+              <a:ext uri="{FF2B5EF4-FFF2-40B4-BE49-F238E27FC236}">
+                <a16:creationId xmlns:a16="http://schemas.microsoft.com/office/drawing/2014/main" id="{02E1938A-0349-466D-BF38-44C192391E0D}"/>
+              </a:ext>
+            </a:extLst>
+          </p:cNvPr>
+          <p:cNvSpPr txBox="1"/>
+          <p:nvPr/>
+        </p:nvSpPr>
+        <p:spPr>
+          <a:xfrm>
+            <a:off x="390526" y="4232315"/>
+            <a:ext cx="9738896" cy="2031325"/>
+          </a:xfrm>
+          <a:prstGeom prst="rect">
+            <a:avLst/>
+          </a:prstGeom>
+          <a:noFill/>
+        </p:spPr>
+        <p:txBody>
+          <a:bodyPr wrap="square" rtlCol="0">
+            <a:spAutoFit/>
+          </a:bodyPr>
+          <a:lstStyle/>
+          <a:p>
+            <a:r>
+              <a:rPr lang="de-DE" dirty="0"/>
+              <a:t>Weitere Datensatzinfo:</a:t>
+            </a:r>
+          </a:p>
+          <a:p>
+            <a:pPr lvl="0"/>
+            <a:r>
+              <a:rPr lang="de-DE" dirty="0"/>
+              <a:t>Alle Patienten haben die Masken 1-4</a:t>
+            </a:r>
+          </a:p>
+          <a:p>
+            <a:pPr lvl="1"/>
+            <a:r>
+              <a:rPr lang="de-DE" dirty="0"/>
+              <a:t>Maske 1 ist die </a:t>
+            </a:r>
+            <a:r>
+              <a:rPr lang="de-DE" dirty="0" err="1"/>
+              <a:t>VergleichsROI</a:t>
+            </a:r>
+            <a:r>
+              <a:rPr lang="de-DE" dirty="0"/>
+              <a:t> in der Leber</a:t>
+            </a:r>
+          </a:p>
+          <a:p>
+            <a:pPr lvl="1"/>
+            <a:r>
+              <a:rPr lang="de-DE" dirty="0"/>
+              <a:t>Maske 2 auch in der Leber (ist noch zu klären, scheint aber auch einfach eine kleine </a:t>
+            </a:r>
+            <a:r>
+              <a:rPr lang="de-DE" dirty="0" err="1"/>
+              <a:t>VergleichsROI</a:t>
+            </a:r>
+            <a:r>
+              <a:rPr lang="de-DE" dirty="0"/>
+              <a:t> zu sein)</a:t>
+            </a:r>
+          </a:p>
+          <a:p>
+            <a:pPr lvl="1"/>
+            <a:r>
+              <a:rPr lang="de-DE" dirty="0"/>
+              <a:t>Maske 3 und 4 sind Schichtmasken (zweidimensional und sehr klein – sind nicht wichtig)</a:t>
+            </a:r>
+          </a:p>
+          <a:p>
+            <a:pPr lvl="0"/>
+            <a:r>
+              <a:rPr lang="de-DE" dirty="0"/>
+              <a:t>Ab Maske 5 – X wird krankhaftes Gewebe segmentiert</a:t>
+            </a:r>
+          </a:p>
+        </p:txBody>
+      </p:sp>
     </p:spTree>
     <p:extLst>
       <p:ext uri="{BB962C8B-B14F-4D97-AF65-F5344CB8AC3E}">

</xml_diff>